<commit_message>
Illustrating query optimalisation and filter
</commit_message>
<xml_diff>
--- a/src/query inversion diagrams.pptx
+++ b/src/query inversion diagrams.pptx
@@ -7,7 +7,8 @@
   <p:sldIdLst>
     <p:sldId id="257" r:id="rId2"/>
     <p:sldId id="258" r:id="rId3"/>
-    <p:sldId id="259" r:id="rId4"/>
+    <p:sldId id="260" r:id="rId4"/>
+    <p:sldId id="259" r:id="rId5"/>
   </p:sldIdLst>
   <p:sldSz cx="12192000" cy="6858000"/>
   <p:notesSz cx="6858000" cy="9144000"/>
@@ -263,7 +264,7 @@
           <a:p>
             <a:fld id="{291856B5-8E29-B64F-9105-14345E3ED281}" type="datetimeFigureOut">
               <a:rPr lang="en-NL" smtClean="0"/>
-              <a:t>02/11/2023</a:t>
+              <a:t>06/11/2023</a:t>
             </a:fld>
             <a:endParaRPr lang="en-NL"/>
           </a:p>
@@ -463,7 +464,7 @@
           <a:p>
             <a:fld id="{291856B5-8E29-B64F-9105-14345E3ED281}" type="datetimeFigureOut">
               <a:rPr lang="en-NL" smtClean="0"/>
-              <a:t>02/11/2023</a:t>
+              <a:t>06/11/2023</a:t>
             </a:fld>
             <a:endParaRPr lang="en-NL"/>
           </a:p>
@@ -673,7 +674,7 @@
           <a:p>
             <a:fld id="{291856B5-8E29-B64F-9105-14345E3ED281}" type="datetimeFigureOut">
               <a:rPr lang="en-NL" smtClean="0"/>
-              <a:t>02/11/2023</a:t>
+              <a:t>06/11/2023</a:t>
             </a:fld>
             <a:endParaRPr lang="en-NL"/>
           </a:p>
@@ -873,7 +874,7 @@
           <a:p>
             <a:fld id="{291856B5-8E29-B64F-9105-14345E3ED281}" type="datetimeFigureOut">
               <a:rPr lang="en-NL" smtClean="0"/>
-              <a:t>02/11/2023</a:t>
+              <a:t>06/11/2023</a:t>
             </a:fld>
             <a:endParaRPr lang="en-NL"/>
           </a:p>
@@ -1149,7 +1150,7 @@
           <a:p>
             <a:fld id="{291856B5-8E29-B64F-9105-14345E3ED281}" type="datetimeFigureOut">
               <a:rPr lang="en-NL" smtClean="0"/>
-              <a:t>02/11/2023</a:t>
+              <a:t>06/11/2023</a:t>
             </a:fld>
             <a:endParaRPr lang="en-NL"/>
           </a:p>
@@ -1417,7 +1418,7 @@
           <a:p>
             <a:fld id="{291856B5-8E29-B64F-9105-14345E3ED281}" type="datetimeFigureOut">
               <a:rPr lang="en-NL" smtClean="0"/>
-              <a:t>02/11/2023</a:t>
+              <a:t>06/11/2023</a:t>
             </a:fld>
             <a:endParaRPr lang="en-NL"/>
           </a:p>
@@ -1832,7 +1833,7 @@
           <a:p>
             <a:fld id="{291856B5-8E29-B64F-9105-14345E3ED281}" type="datetimeFigureOut">
               <a:rPr lang="en-NL" smtClean="0"/>
-              <a:t>02/11/2023</a:t>
+              <a:t>06/11/2023</a:t>
             </a:fld>
             <a:endParaRPr lang="en-NL"/>
           </a:p>
@@ -1974,7 +1975,7 @@
           <a:p>
             <a:fld id="{291856B5-8E29-B64F-9105-14345E3ED281}" type="datetimeFigureOut">
               <a:rPr lang="en-NL" smtClean="0"/>
-              <a:t>02/11/2023</a:t>
+              <a:t>06/11/2023</a:t>
             </a:fld>
             <a:endParaRPr lang="en-NL"/>
           </a:p>
@@ -2087,7 +2088,7 @@
           <a:p>
             <a:fld id="{291856B5-8E29-B64F-9105-14345E3ED281}" type="datetimeFigureOut">
               <a:rPr lang="en-NL" smtClean="0"/>
-              <a:t>02/11/2023</a:t>
+              <a:t>06/11/2023</a:t>
             </a:fld>
             <a:endParaRPr lang="en-NL"/>
           </a:p>
@@ -2400,7 +2401,7 @@
           <a:p>
             <a:fld id="{291856B5-8E29-B64F-9105-14345E3ED281}" type="datetimeFigureOut">
               <a:rPr lang="en-NL" smtClean="0"/>
-              <a:t>02/11/2023</a:t>
+              <a:t>06/11/2023</a:t>
             </a:fld>
             <a:endParaRPr lang="en-NL"/>
           </a:p>
@@ -2689,7 +2690,7 @@
           <a:p>
             <a:fld id="{291856B5-8E29-B64F-9105-14345E3ED281}" type="datetimeFigureOut">
               <a:rPr lang="en-NL" smtClean="0"/>
-              <a:t>02/11/2023</a:t>
+              <a:t>06/11/2023</a:t>
             </a:fld>
             <a:endParaRPr lang="en-NL"/>
           </a:p>
@@ -2932,7 +2933,7 @@
           <a:p>
             <a:fld id="{291856B5-8E29-B64F-9105-14345E3ED281}" type="datetimeFigureOut">
               <a:rPr lang="en-NL" smtClean="0"/>
-              <a:t>02/11/2023</a:t>
+              <a:t>06/11/2023</a:t>
             </a:fld>
             <a:endParaRPr lang="en-NL"/>
           </a:p>
@@ -5927,6 +5928,946 @@
       </p:grpSpPr>
       <p:sp>
         <p:nvSpPr>
+          <p:cNvPr id="2" name="Oval 1">
+            <a:extLst>
+              <a:ext uri="{FF2B5EF4-FFF2-40B4-BE49-F238E27FC236}">
+                <a16:creationId xmlns:a16="http://schemas.microsoft.com/office/drawing/2014/main" id="{C653108A-D181-D577-34DA-B59E925FE596}"/>
+              </a:ext>
+            </a:extLst>
+          </p:cNvPr>
+          <p:cNvSpPr/>
+          <p:nvPr/>
+        </p:nvSpPr>
+        <p:spPr>
+          <a:xfrm>
+            <a:off x="6763271" y="1705651"/>
+            <a:ext cx="580767" cy="580767"/>
+          </a:xfrm>
+          <a:prstGeom prst="ellipse">
+            <a:avLst/>
+          </a:prstGeom>
+          <a:noFill/>
+        </p:spPr>
+        <p:style>
+          <a:lnRef idx="2">
+            <a:schemeClr val="accent1">
+              <a:shade val="50000"/>
+            </a:schemeClr>
+          </a:lnRef>
+          <a:fillRef idx="1">
+            <a:schemeClr val="accent1"/>
+          </a:fillRef>
+          <a:effectRef idx="0">
+            <a:schemeClr val="accent1"/>
+          </a:effectRef>
+          <a:fontRef idx="minor">
+            <a:schemeClr val="lt1"/>
+          </a:fontRef>
+        </p:style>
+        <p:txBody>
+          <a:bodyPr rtlCol="0" anchor="ctr"/>
+          <a:lstStyle/>
+          <a:p>
+            <a:pPr algn="ctr"/>
+            <a:r>
+              <a:rPr lang="en-NL" dirty="0">
+                <a:solidFill>
+                  <a:schemeClr val="tx1"/>
+                </a:solidFill>
+              </a:rPr>
+              <a:t>r1</a:t>
+            </a:r>
+          </a:p>
+        </p:txBody>
+      </p:sp>
+      <p:sp>
+        <p:nvSpPr>
+          <p:cNvPr id="3" name="Oval 2">
+            <a:extLst>
+              <a:ext uri="{FF2B5EF4-FFF2-40B4-BE49-F238E27FC236}">
+                <a16:creationId xmlns:a16="http://schemas.microsoft.com/office/drawing/2014/main" id="{D37B5B61-25E9-1705-7357-C6A1533A5842}"/>
+              </a:ext>
+            </a:extLst>
+          </p:cNvPr>
+          <p:cNvSpPr/>
+          <p:nvPr/>
+        </p:nvSpPr>
+        <p:spPr>
+          <a:xfrm>
+            <a:off x="6763271" y="685915"/>
+            <a:ext cx="580767" cy="580767"/>
+          </a:xfrm>
+          <a:prstGeom prst="ellipse">
+            <a:avLst/>
+          </a:prstGeom>
+          <a:noFill/>
+        </p:spPr>
+        <p:style>
+          <a:lnRef idx="2">
+            <a:schemeClr val="accent1">
+              <a:shade val="50000"/>
+            </a:schemeClr>
+          </a:lnRef>
+          <a:fillRef idx="1">
+            <a:schemeClr val="accent1"/>
+          </a:fillRef>
+          <a:effectRef idx="0">
+            <a:schemeClr val="accent1"/>
+          </a:effectRef>
+          <a:fontRef idx="minor">
+            <a:schemeClr val="lt1"/>
+          </a:fontRef>
+        </p:style>
+        <p:txBody>
+          <a:bodyPr rtlCol="0" anchor="ctr"/>
+          <a:lstStyle/>
+          <a:p>
+            <a:pPr algn="ctr"/>
+            <a:r>
+              <a:rPr lang="en-NL" dirty="0">
+                <a:solidFill>
+                  <a:schemeClr val="tx1"/>
+                </a:solidFill>
+              </a:rPr>
+              <a:t>r2</a:t>
+            </a:r>
+          </a:p>
+        </p:txBody>
+      </p:sp>
+      <p:cxnSp>
+        <p:nvCxnSpPr>
+          <p:cNvPr id="4" name="Curved Connector 3">
+            <a:extLst>
+              <a:ext uri="{FF2B5EF4-FFF2-40B4-BE49-F238E27FC236}">
+                <a16:creationId xmlns:a16="http://schemas.microsoft.com/office/drawing/2014/main" id="{3106DAF4-25FD-FC90-3BD1-E81CFC8C34F4}"/>
+              </a:ext>
+            </a:extLst>
+          </p:cNvPr>
+          <p:cNvCxnSpPr>
+            <a:cxnSpLocks/>
+            <a:stCxn id="2" idx="2"/>
+            <a:endCxn id="3" idx="2"/>
+          </p:cNvCxnSpPr>
+          <p:nvPr/>
+        </p:nvCxnSpPr>
+        <p:spPr>
+          <a:xfrm rot="10800000">
+            <a:off x="6763271" y="976299"/>
+            <a:ext cx="12700" cy="1019736"/>
+          </a:xfrm>
+          <a:prstGeom prst="curvedConnector3">
+            <a:avLst>
+              <a:gd name="adj1" fmla="val 1800000"/>
+            </a:avLst>
+          </a:prstGeom>
+          <a:ln w="38100">
+            <a:solidFill>
+              <a:schemeClr val="accent6"/>
+            </a:solidFill>
+            <a:tailEnd type="triangle"/>
+          </a:ln>
+        </p:spPr>
+        <p:style>
+          <a:lnRef idx="1">
+            <a:schemeClr val="accent1"/>
+          </a:lnRef>
+          <a:fillRef idx="0">
+            <a:schemeClr val="accent1"/>
+          </a:fillRef>
+          <a:effectRef idx="0">
+            <a:schemeClr val="accent1"/>
+          </a:effectRef>
+          <a:fontRef idx="minor">
+            <a:schemeClr val="tx1"/>
+          </a:fontRef>
+        </p:style>
+      </p:cxnSp>
+      <p:sp>
+        <p:nvSpPr>
+          <p:cNvPr id="5" name="TextBox 4">
+            <a:extLst>
+              <a:ext uri="{FF2B5EF4-FFF2-40B4-BE49-F238E27FC236}">
+                <a16:creationId xmlns:a16="http://schemas.microsoft.com/office/drawing/2014/main" id="{C813869B-9AC6-CECA-22D9-237BB45A13EE}"/>
+              </a:ext>
+            </a:extLst>
+          </p:cNvPr>
+          <p:cNvSpPr txBox="1"/>
+          <p:nvPr/>
+        </p:nvSpPr>
+        <p:spPr>
+          <a:xfrm>
+            <a:off x="5723952" y="1309017"/>
+            <a:ext cx="609462" cy="369332"/>
+          </a:xfrm>
+          <a:prstGeom prst="rect">
+            <a:avLst/>
+          </a:prstGeom>
+          <a:noFill/>
+        </p:spPr>
+        <p:txBody>
+          <a:bodyPr wrap="none" rtlCol="0">
+            <a:spAutoFit/>
+          </a:bodyPr>
+          <a:lstStyle/>
+          <a:p>
+            <a:r>
+              <a:rPr lang="en-NL" dirty="0">
+                <a:solidFill>
+                  <a:schemeClr val="accent6"/>
+                </a:solidFill>
+              </a:rPr>
+              <a:t>filler</a:t>
+            </a:r>
+          </a:p>
+        </p:txBody>
+      </p:sp>
+      <p:cxnSp>
+        <p:nvCxnSpPr>
+          <p:cNvPr id="6" name="Curved Connector 5">
+            <a:extLst>
+              <a:ext uri="{FF2B5EF4-FFF2-40B4-BE49-F238E27FC236}">
+                <a16:creationId xmlns:a16="http://schemas.microsoft.com/office/drawing/2014/main" id="{5CA98E53-CCB7-51C5-44A9-EB89310F3E68}"/>
+              </a:ext>
+            </a:extLst>
+          </p:cNvPr>
+          <p:cNvCxnSpPr>
+            <a:cxnSpLocks/>
+            <a:stCxn id="3" idx="6"/>
+            <a:endCxn id="2" idx="6"/>
+          </p:cNvCxnSpPr>
+          <p:nvPr/>
+        </p:nvCxnSpPr>
+        <p:spPr>
+          <a:xfrm>
+            <a:off x="7344038" y="976299"/>
+            <a:ext cx="12700" cy="1019736"/>
+          </a:xfrm>
+          <a:prstGeom prst="curvedConnector3">
+            <a:avLst>
+              <a:gd name="adj1" fmla="val 1800000"/>
+            </a:avLst>
+          </a:prstGeom>
+          <a:ln w="38100">
+            <a:solidFill>
+              <a:schemeClr val="accent2"/>
+            </a:solidFill>
+            <a:tailEnd type="triangle"/>
+          </a:ln>
+        </p:spPr>
+        <p:style>
+          <a:lnRef idx="1">
+            <a:schemeClr val="accent1"/>
+          </a:lnRef>
+          <a:fillRef idx="0">
+            <a:schemeClr val="accent1"/>
+          </a:fillRef>
+          <a:effectRef idx="0">
+            <a:schemeClr val="accent1"/>
+          </a:effectRef>
+          <a:fontRef idx="minor">
+            <a:schemeClr val="tx1"/>
+          </a:fontRef>
+        </p:style>
+      </p:cxnSp>
+      <p:sp>
+        <p:nvSpPr>
+          <p:cNvPr id="7" name="TextBox 6">
+            <a:extLst>
+              <a:ext uri="{FF2B5EF4-FFF2-40B4-BE49-F238E27FC236}">
+                <a16:creationId xmlns:a16="http://schemas.microsoft.com/office/drawing/2014/main" id="{93C858B9-724F-251D-0753-DDB84C4A8E70}"/>
+              </a:ext>
+            </a:extLst>
+          </p:cNvPr>
+          <p:cNvSpPr txBox="1"/>
+          <p:nvPr/>
+        </p:nvSpPr>
+        <p:spPr>
+          <a:xfrm>
+            <a:off x="7623162" y="1309017"/>
+            <a:ext cx="901209" cy="369332"/>
+          </a:xfrm>
+          <a:prstGeom prst="rect">
+            <a:avLst/>
+          </a:prstGeom>
+          <a:noFill/>
+        </p:spPr>
+        <p:txBody>
+          <a:bodyPr wrap="none" rtlCol="0">
+            <a:spAutoFit/>
+          </a:bodyPr>
+          <a:lstStyle/>
+          <a:p>
+            <a:r>
+              <a:rPr lang="en-NL" dirty="0">
+                <a:solidFill>
+                  <a:schemeClr val="accent2"/>
+                </a:solidFill>
+              </a:rPr>
+              <a:t>filled r1</a:t>
+            </a:r>
+          </a:p>
+        </p:txBody>
+      </p:sp>
+      <p:sp>
+        <p:nvSpPr>
+          <p:cNvPr id="8" name="Line Callout 1 7">
+            <a:extLst>
+              <a:ext uri="{FF2B5EF4-FFF2-40B4-BE49-F238E27FC236}">
+                <a16:creationId xmlns:a16="http://schemas.microsoft.com/office/drawing/2014/main" id="{C9C43E9F-0A1F-6D25-A621-24CB013F0A5A}"/>
+              </a:ext>
+            </a:extLst>
+          </p:cNvPr>
+          <p:cNvSpPr/>
+          <p:nvPr/>
+        </p:nvSpPr>
+        <p:spPr>
+          <a:xfrm flipH="1">
+            <a:off x="1622657" y="1663765"/>
+            <a:ext cx="3486951" cy="646331"/>
+          </a:xfrm>
+          <a:prstGeom prst="borderCallout1">
+            <a:avLst>
+              <a:gd name="adj1" fmla="val 50696"/>
+              <a:gd name="adj2" fmla="val -2071"/>
+              <a:gd name="adj3" fmla="val 49649"/>
+              <a:gd name="adj4" fmla="val -35545"/>
+            </a:avLst>
+          </a:prstGeom>
+          <a:noFill/>
+          <a:ln>
+            <a:solidFill>
+              <a:schemeClr val="accent2"/>
+            </a:solidFill>
+          </a:ln>
+        </p:spPr>
+        <p:style>
+          <a:lnRef idx="2">
+            <a:schemeClr val="accent1">
+              <a:shade val="50000"/>
+            </a:schemeClr>
+          </a:lnRef>
+          <a:fillRef idx="1">
+            <a:schemeClr val="accent1"/>
+          </a:fillRef>
+          <a:effectRef idx="0">
+            <a:schemeClr val="accent1"/>
+          </a:effectRef>
+          <a:fontRef idx="minor">
+            <a:schemeClr val="lt1"/>
+          </a:fontRef>
+        </p:style>
+        <p:txBody>
+          <a:bodyPr rtlCol="0" anchor="ctr"/>
+          <a:lstStyle/>
+          <a:p>
+            <a:r>
+              <a:rPr lang="en-US" sz="1400" dirty="0" err="1">
+                <a:solidFill>
+                  <a:schemeClr val="accent2"/>
+                </a:solidFill>
+              </a:rPr>
+              <a:t>filledInvertedQueries</a:t>
+            </a:r>
+            <a:r>
+              <a:rPr lang="en-NL" sz="1400" dirty="0">
+                <a:solidFill>
+                  <a:schemeClr val="accent2"/>
+                </a:solidFill>
+              </a:rPr>
+              <a:t> = </a:t>
+            </a:r>
+          </a:p>
+          <a:p>
+            <a:r>
+              <a:rPr lang="en-NL" sz="1400" dirty="0">
+                <a:solidFill>
+                  <a:schemeClr val="accent2"/>
+                </a:solidFill>
+              </a:rPr>
+              <a:t>   (filterWith B) &gt;&gt; filled r1 </a:t>
+            </a:r>
+            <a:r>
+              <a:rPr lang="en-NL" sz="1400" dirty="0">
+                <a:solidFill>
+                  <a:schemeClr val="tx1"/>
+                </a:solidFill>
+              </a:rPr>
+              <a:t>apply to r2</a:t>
+            </a:r>
+          </a:p>
+        </p:txBody>
+      </p:sp>
+      <p:sp>
+        <p:nvSpPr>
+          <p:cNvPr id="9" name="Oval 8">
+            <a:extLst>
+              <a:ext uri="{FF2B5EF4-FFF2-40B4-BE49-F238E27FC236}">
+                <a16:creationId xmlns:a16="http://schemas.microsoft.com/office/drawing/2014/main" id="{1A0F5AE4-7320-2928-35F8-A7B649B016A7}"/>
+              </a:ext>
+            </a:extLst>
+          </p:cNvPr>
+          <p:cNvSpPr/>
+          <p:nvPr/>
+        </p:nvSpPr>
+        <p:spPr>
+          <a:xfrm>
+            <a:off x="6763271" y="5236121"/>
+            <a:ext cx="580767" cy="580767"/>
+          </a:xfrm>
+          <a:prstGeom prst="ellipse">
+            <a:avLst/>
+          </a:prstGeom>
+          <a:noFill/>
+        </p:spPr>
+        <p:style>
+          <a:lnRef idx="2">
+            <a:schemeClr val="accent1">
+              <a:shade val="50000"/>
+            </a:schemeClr>
+          </a:lnRef>
+          <a:fillRef idx="1">
+            <a:schemeClr val="accent1"/>
+          </a:fillRef>
+          <a:effectRef idx="0">
+            <a:schemeClr val="accent1"/>
+          </a:effectRef>
+          <a:fontRef idx="minor">
+            <a:schemeClr val="lt1"/>
+          </a:fontRef>
+        </p:style>
+        <p:txBody>
+          <a:bodyPr rtlCol="0" anchor="ctr"/>
+          <a:lstStyle/>
+          <a:p>
+            <a:pPr algn="ctr"/>
+            <a:r>
+              <a:rPr lang="en-NL" dirty="0">
+                <a:solidFill>
+                  <a:schemeClr val="tx1"/>
+                </a:solidFill>
+              </a:rPr>
+              <a:t>r1</a:t>
+            </a:r>
+          </a:p>
+        </p:txBody>
+      </p:sp>
+      <p:sp>
+        <p:nvSpPr>
+          <p:cNvPr id="10" name="Oval 9">
+            <a:extLst>
+              <a:ext uri="{FF2B5EF4-FFF2-40B4-BE49-F238E27FC236}">
+                <a16:creationId xmlns:a16="http://schemas.microsoft.com/office/drawing/2014/main" id="{CE5D047C-6012-1AE6-D3F5-CD67592DB7E4}"/>
+              </a:ext>
+            </a:extLst>
+          </p:cNvPr>
+          <p:cNvSpPr/>
+          <p:nvPr/>
+        </p:nvSpPr>
+        <p:spPr>
+          <a:xfrm>
+            <a:off x="6763271" y="4216385"/>
+            <a:ext cx="580767" cy="580767"/>
+          </a:xfrm>
+          <a:prstGeom prst="ellipse">
+            <a:avLst/>
+          </a:prstGeom>
+          <a:noFill/>
+        </p:spPr>
+        <p:style>
+          <a:lnRef idx="2">
+            <a:schemeClr val="accent1">
+              <a:shade val="50000"/>
+            </a:schemeClr>
+          </a:lnRef>
+          <a:fillRef idx="1">
+            <a:schemeClr val="accent1"/>
+          </a:fillRef>
+          <a:effectRef idx="0">
+            <a:schemeClr val="accent1"/>
+          </a:effectRef>
+          <a:fontRef idx="minor">
+            <a:schemeClr val="lt1"/>
+          </a:fontRef>
+        </p:style>
+        <p:txBody>
+          <a:bodyPr rtlCol="0" anchor="ctr"/>
+          <a:lstStyle/>
+          <a:p>
+            <a:pPr algn="ctr"/>
+            <a:r>
+              <a:rPr lang="en-NL" dirty="0">
+                <a:solidFill>
+                  <a:schemeClr val="tx1"/>
+                </a:solidFill>
+              </a:rPr>
+              <a:t>r2</a:t>
+            </a:r>
+          </a:p>
+        </p:txBody>
+      </p:sp>
+      <p:cxnSp>
+        <p:nvCxnSpPr>
+          <p:cNvPr id="11" name="Curved Connector 10">
+            <a:extLst>
+              <a:ext uri="{FF2B5EF4-FFF2-40B4-BE49-F238E27FC236}">
+                <a16:creationId xmlns:a16="http://schemas.microsoft.com/office/drawing/2014/main" id="{9C44E013-5876-95DB-B198-2FBF10E305EC}"/>
+              </a:ext>
+            </a:extLst>
+          </p:cNvPr>
+          <p:cNvCxnSpPr>
+            <a:cxnSpLocks/>
+            <a:stCxn id="9" idx="2"/>
+            <a:endCxn id="10" idx="2"/>
+          </p:cNvCxnSpPr>
+          <p:nvPr/>
+        </p:nvCxnSpPr>
+        <p:spPr>
+          <a:xfrm rot="10800000">
+            <a:off x="6763271" y="4506769"/>
+            <a:ext cx="12700" cy="1019736"/>
+          </a:xfrm>
+          <a:prstGeom prst="curvedConnector3">
+            <a:avLst>
+              <a:gd name="adj1" fmla="val 1800000"/>
+            </a:avLst>
+          </a:prstGeom>
+          <a:ln w="38100">
+            <a:solidFill>
+              <a:schemeClr val="accent6"/>
+            </a:solidFill>
+            <a:tailEnd type="triangle"/>
+          </a:ln>
+        </p:spPr>
+        <p:style>
+          <a:lnRef idx="1">
+            <a:schemeClr val="accent1"/>
+          </a:lnRef>
+          <a:fillRef idx="0">
+            <a:schemeClr val="accent1"/>
+          </a:fillRef>
+          <a:effectRef idx="0">
+            <a:schemeClr val="accent1"/>
+          </a:effectRef>
+          <a:fontRef idx="minor">
+            <a:schemeClr val="tx1"/>
+          </a:fontRef>
+        </p:style>
+      </p:cxnSp>
+      <p:sp>
+        <p:nvSpPr>
+          <p:cNvPr id="12" name="TextBox 11">
+            <a:extLst>
+              <a:ext uri="{FF2B5EF4-FFF2-40B4-BE49-F238E27FC236}">
+                <a16:creationId xmlns:a16="http://schemas.microsoft.com/office/drawing/2014/main" id="{DD2FA065-17AB-D7F5-F931-A439F3FF62CA}"/>
+              </a:ext>
+            </a:extLst>
+          </p:cNvPr>
+          <p:cNvSpPr txBox="1"/>
+          <p:nvPr/>
+        </p:nvSpPr>
+        <p:spPr>
+          <a:xfrm>
+            <a:off x="5723952" y="4839487"/>
+            <a:ext cx="609462" cy="369332"/>
+          </a:xfrm>
+          <a:prstGeom prst="rect">
+            <a:avLst/>
+          </a:prstGeom>
+          <a:noFill/>
+        </p:spPr>
+        <p:txBody>
+          <a:bodyPr wrap="none" rtlCol="0">
+            <a:spAutoFit/>
+          </a:bodyPr>
+          <a:lstStyle/>
+          <a:p>
+            <a:r>
+              <a:rPr lang="en-NL" dirty="0">
+                <a:solidFill>
+                  <a:schemeClr val="accent6"/>
+                </a:solidFill>
+              </a:rPr>
+              <a:t>filler</a:t>
+            </a:r>
+          </a:p>
+        </p:txBody>
+      </p:sp>
+      <p:cxnSp>
+        <p:nvCxnSpPr>
+          <p:cNvPr id="13" name="Curved Connector 12">
+            <a:extLst>
+              <a:ext uri="{FF2B5EF4-FFF2-40B4-BE49-F238E27FC236}">
+                <a16:creationId xmlns:a16="http://schemas.microsoft.com/office/drawing/2014/main" id="{ADB1E1B8-939F-6BD9-2076-916311E92B52}"/>
+              </a:ext>
+            </a:extLst>
+          </p:cNvPr>
+          <p:cNvCxnSpPr>
+            <a:cxnSpLocks/>
+            <a:stCxn id="10" idx="6"/>
+            <a:endCxn id="9" idx="6"/>
+          </p:cNvCxnSpPr>
+          <p:nvPr/>
+        </p:nvCxnSpPr>
+        <p:spPr>
+          <a:xfrm>
+            <a:off x="7344038" y="4506769"/>
+            <a:ext cx="12700" cy="1019736"/>
+          </a:xfrm>
+          <a:prstGeom prst="curvedConnector3">
+            <a:avLst>
+              <a:gd name="adj1" fmla="val 1800000"/>
+            </a:avLst>
+          </a:prstGeom>
+          <a:ln w="38100">
+            <a:solidFill>
+              <a:schemeClr val="accent2"/>
+            </a:solidFill>
+            <a:tailEnd type="triangle"/>
+          </a:ln>
+        </p:spPr>
+        <p:style>
+          <a:lnRef idx="1">
+            <a:schemeClr val="accent1"/>
+          </a:lnRef>
+          <a:fillRef idx="0">
+            <a:schemeClr val="accent1"/>
+          </a:fillRef>
+          <a:effectRef idx="0">
+            <a:schemeClr val="accent1"/>
+          </a:effectRef>
+          <a:fontRef idx="minor">
+            <a:schemeClr val="tx1"/>
+          </a:fontRef>
+        </p:style>
+      </p:cxnSp>
+      <p:sp>
+        <p:nvSpPr>
+          <p:cNvPr id="14" name="TextBox 13">
+            <a:extLst>
+              <a:ext uri="{FF2B5EF4-FFF2-40B4-BE49-F238E27FC236}">
+                <a16:creationId xmlns:a16="http://schemas.microsoft.com/office/drawing/2014/main" id="{FEB58CCB-CD13-E024-C169-43F9A73A711A}"/>
+              </a:ext>
+            </a:extLst>
+          </p:cNvPr>
+          <p:cNvSpPr txBox="1"/>
+          <p:nvPr/>
+        </p:nvSpPr>
+        <p:spPr>
+          <a:xfrm>
+            <a:off x="7623162" y="4839487"/>
+            <a:ext cx="901209" cy="369332"/>
+          </a:xfrm>
+          <a:prstGeom prst="rect">
+            <a:avLst/>
+          </a:prstGeom>
+          <a:noFill/>
+        </p:spPr>
+        <p:txBody>
+          <a:bodyPr wrap="none" rtlCol="0">
+            <a:spAutoFit/>
+          </a:bodyPr>
+          <a:lstStyle/>
+          <a:p>
+            <a:r>
+              <a:rPr lang="en-NL" dirty="0">
+                <a:solidFill>
+                  <a:schemeClr val="accent2"/>
+                </a:solidFill>
+              </a:rPr>
+              <a:t>filled r1</a:t>
+            </a:r>
+          </a:p>
+        </p:txBody>
+      </p:sp>
+      <p:sp>
+        <p:nvSpPr>
+          <p:cNvPr id="15" name="Line Callout 1 14">
+            <a:extLst>
+              <a:ext uri="{FF2B5EF4-FFF2-40B4-BE49-F238E27FC236}">
+                <a16:creationId xmlns:a16="http://schemas.microsoft.com/office/drawing/2014/main" id="{15F14BD8-E538-E7F4-2EE4-0FC2149FFED2}"/>
+              </a:ext>
+            </a:extLst>
+          </p:cNvPr>
+          <p:cNvSpPr/>
+          <p:nvPr/>
+        </p:nvSpPr>
+        <p:spPr>
+          <a:xfrm flipH="1">
+            <a:off x="1622657" y="5194235"/>
+            <a:ext cx="3486951" cy="646331"/>
+          </a:xfrm>
+          <a:prstGeom prst="borderCallout1">
+            <a:avLst>
+              <a:gd name="adj1" fmla="val 50696"/>
+              <a:gd name="adj2" fmla="val -2071"/>
+              <a:gd name="adj3" fmla="val 49649"/>
+              <a:gd name="adj4" fmla="val -35545"/>
+            </a:avLst>
+          </a:prstGeom>
+          <a:noFill/>
+          <a:ln>
+            <a:solidFill>
+              <a:schemeClr val="accent2"/>
+            </a:solidFill>
+          </a:ln>
+        </p:spPr>
+        <p:style>
+          <a:lnRef idx="2">
+            <a:schemeClr val="accent1">
+              <a:shade val="50000"/>
+            </a:schemeClr>
+          </a:lnRef>
+          <a:fillRef idx="1">
+            <a:schemeClr val="accent1"/>
+          </a:fillRef>
+          <a:effectRef idx="0">
+            <a:schemeClr val="accent1"/>
+          </a:effectRef>
+          <a:fontRef idx="minor">
+            <a:schemeClr val="lt1"/>
+          </a:fontRef>
+        </p:style>
+        <p:txBody>
+          <a:bodyPr rtlCol="0" anchor="ctr"/>
+          <a:lstStyle/>
+          <a:p>
+            <a:r>
+              <a:rPr lang="en-US" sz="1400" dirty="0" err="1">
+                <a:solidFill>
+                  <a:schemeClr val="accent2"/>
+                </a:solidFill>
+              </a:rPr>
+              <a:t>filledInvertedQueries</a:t>
+            </a:r>
+            <a:r>
+              <a:rPr lang="en-NL" sz="1400" dirty="0">
+                <a:solidFill>
+                  <a:schemeClr val="accent2"/>
+                </a:solidFill>
+              </a:rPr>
+              <a:t> = </a:t>
+            </a:r>
+          </a:p>
+          <a:p>
+            <a:r>
+              <a:rPr lang="en-NL" sz="1400" dirty="0">
+                <a:solidFill>
+                  <a:schemeClr val="accent2"/>
+                </a:solidFill>
+              </a:rPr>
+              <a:t>   (filterWith filler &gt;&gt; B) </a:t>
+            </a:r>
+            <a:r>
+              <a:rPr lang="en-NL" sz="1400" dirty="0">
+                <a:solidFill>
+                  <a:schemeClr val="tx1"/>
+                </a:solidFill>
+              </a:rPr>
+              <a:t>apply to new filled r1</a:t>
+            </a:r>
+          </a:p>
+        </p:txBody>
+      </p:sp>
+      <p:sp>
+        <p:nvSpPr>
+          <p:cNvPr id="17" name="Line Callout 1 16">
+            <a:extLst>
+              <a:ext uri="{FF2B5EF4-FFF2-40B4-BE49-F238E27FC236}">
+                <a16:creationId xmlns:a16="http://schemas.microsoft.com/office/drawing/2014/main" id="{EE1E5B25-BADC-77CF-253A-3847E2180220}"/>
+              </a:ext>
+            </a:extLst>
+          </p:cNvPr>
+          <p:cNvSpPr/>
+          <p:nvPr/>
+        </p:nvSpPr>
+        <p:spPr>
+          <a:xfrm>
+            <a:off x="8163120" y="357902"/>
+            <a:ext cx="2170408" cy="428107"/>
+          </a:xfrm>
+          <a:prstGeom prst="borderCallout1">
+            <a:avLst/>
+          </a:prstGeom>
+          <a:noFill/>
+          <a:ln>
+            <a:solidFill>
+              <a:schemeClr val="accent1">
+                <a:shade val="15000"/>
+              </a:schemeClr>
+            </a:solidFill>
+          </a:ln>
+        </p:spPr>
+        <p:style>
+          <a:lnRef idx="2">
+            <a:schemeClr val="accent1">
+              <a:shade val="15000"/>
+            </a:schemeClr>
+          </a:lnRef>
+          <a:fillRef idx="1">
+            <a:schemeClr val="accent1"/>
+          </a:fillRef>
+          <a:effectRef idx="0">
+            <a:schemeClr val="accent1"/>
+          </a:effectRef>
+          <a:fontRef idx="minor">
+            <a:schemeClr val="lt1"/>
+          </a:fontRef>
+        </p:style>
+        <p:txBody>
+          <a:bodyPr rtlCol="0" anchor="ctr"/>
+          <a:lstStyle/>
+          <a:p>
+            <a:pPr algn="ctr"/>
+            <a:r>
+              <a:rPr lang="en-NL" dirty="0">
+                <a:solidFill>
+                  <a:schemeClr val="tx1"/>
+                </a:solidFill>
+              </a:rPr>
+              <a:t>B (Boolean property)</a:t>
+            </a:r>
+          </a:p>
+        </p:txBody>
+      </p:sp>
+      <p:sp>
+        <p:nvSpPr>
+          <p:cNvPr id="18" name="Line Callout 1 17">
+            <a:extLst>
+              <a:ext uri="{FF2B5EF4-FFF2-40B4-BE49-F238E27FC236}">
+                <a16:creationId xmlns:a16="http://schemas.microsoft.com/office/drawing/2014/main" id="{4C7D6985-7CDA-0376-5405-71A40D1851B8}"/>
+              </a:ext>
+            </a:extLst>
+          </p:cNvPr>
+          <p:cNvSpPr/>
+          <p:nvPr/>
+        </p:nvSpPr>
+        <p:spPr>
+          <a:xfrm>
+            <a:off x="8163120" y="3856885"/>
+            <a:ext cx="2170408" cy="428107"/>
+          </a:xfrm>
+          <a:prstGeom prst="borderCallout1">
+            <a:avLst/>
+          </a:prstGeom>
+          <a:noFill/>
+          <a:ln>
+            <a:solidFill>
+              <a:schemeClr val="accent1">
+                <a:shade val="15000"/>
+              </a:schemeClr>
+            </a:solidFill>
+          </a:ln>
+        </p:spPr>
+        <p:style>
+          <a:lnRef idx="2">
+            <a:schemeClr val="accent1">
+              <a:shade val="15000"/>
+            </a:schemeClr>
+          </a:lnRef>
+          <a:fillRef idx="1">
+            <a:schemeClr val="accent1"/>
+          </a:fillRef>
+          <a:effectRef idx="0">
+            <a:schemeClr val="accent1"/>
+          </a:effectRef>
+          <a:fontRef idx="minor">
+            <a:schemeClr val="lt1"/>
+          </a:fontRef>
+        </p:style>
+        <p:txBody>
+          <a:bodyPr rtlCol="0" anchor="ctr"/>
+          <a:lstStyle/>
+          <a:p>
+            <a:pPr algn="ctr"/>
+            <a:r>
+              <a:rPr lang="en-NL" dirty="0">
+                <a:solidFill>
+                  <a:schemeClr val="tx1"/>
+                </a:solidFill>
+              </a:rPr>
+              <a:t>B (Boolean property)</a:t>
+            </a:r>
+          </a:p>
+        </p:txBody>
+      </p:sp>
+      <p:sp>
+        <p:nvSpPr>
+          <p:cNvPr id="19" name="Down Arrow 18">
+            <a:extLst>
+              <a:ext uri="{FF2B5EF4-FFF2-40B4-BE49-F238E27FC236}">
+                <a16:creationId xmlns:a16="http://schemas.microsoft.com/office/drawing/2014/main" id="{C51E3E16-3045-2271-15A7-56063768F461}"/>
+              </a:ext>
+            </a:extLst>
+          </p:cNvPr>
+          <p:cNvSpPr/>
+          <p:nvPr/>
+        </p:nvSpPr>
+        <p:spPr>
+          <a:xfrm>
+            <a:off x="5723952" y="2971361"/>
+            <a:ext cx="731529" cy="885524"/>
+          </a:xfrm>
+          <a:prstGeom prst="downArrow">
+            <a:avLst/>
+          </a:prstGeom>
+        </p:spPr>
+        <p:style>
+          <a:lnRef idx="2">
+            <a:schemeClr val="accent1">
+              <a:shade val="15000"/>
+            </a:schemeClr>
+          </a:lnRef>
+          <a:fillRef idx="1">
+            <a:schemeClr val="accent1"/>
+          </a:fillRef>
+          <a:effectRef idx="0">
+            <a:schemeClr val="accent1"/>
+          </a:effectRef>
+          <a:fontRef idx="minor">
+            <a:schemeClr val="lt1"/>
+          </a:fontRef>
+        </p:style>
+        <p:txBody>
+          <a:bodyPr rtlCol="0" anchor="ctr"/>
+          <a:lstStyle/>
+          <a:p>
+            <a:pPr algn="ctr"/>
+            <a:endParaRPr lang="en-NL"/>
+          </a:p>
+        </p:txBody>
+      </p:sp>
+    </p:spTree>
+    <p:extLst>
+      <p:ext uri="{BB962C8B-B14F-4D97-AF65-F5344CB8AC3E}">
+        <p14:creationId xmlns:p14="http://schemas.microsoft.com/office/powerpoint/2010/main" val="1566267991"/>
+      </p:ext>
+    </p:extLst>
+  </p:cSld>
+  <p:clrMapOvr>
+    <a:masterClrMapping/>
+  </p:clrMapOvr>
+</p:sld>
+</file>
+
+<file path=ppt/slides/slide4.xml><?xml version="1.0" encoding="utf-8"?>
+<p:sld xmlns:a="http://schemas.openxmlformats.org/drawingml/2006/main" xmlns:r="http://schemas.openxmlformats.org/officeDocument/2006/relationships" xmlns:p="http://schemas.openxmlformats.org/presentationml/2006/main">
+  <p:cSld>
+    <p:spTree>
+      <p:nvGrpSpPr>
+        <p:cNvPr id="1" name=""/>
+        <p:cNvGrpSpPr/>
+        <p:nvPr/>
+      </p:nvGrpSpPr>
+      <p:grpSpPr>
+        <a:xfrm>
+          <a:off x="0" y="0"/>
+          <a:ext cx="0" cy="0"/>
+          <a:chOff x="0" y="0"/>
+          <a:chExt cx="0" cy="0"/>
+        </a:xfrm>
+      </p:grpSpPr>
+      <p:sp>
+        <p:nvSpPr>
           <p:cNvPr id="2" name="Rectangle 1">
             <a:extLst>
               <a:ext uri="{FF2B5EF4-FFF2-40B4-BE49-F238E27FC236}">

</xml_diff>

<commit_message>
Inverted queries in the database
</commit_message>
<xml_diff>
--- a/src/query inversion diagrams.pptx
+++ b/src/query inversion diagrams.pptx
@@ -4,11 +4,15 @@
   <p:sldMasterIdLst>
     <p:sldMasterId id="2147483648" r:id="rId1"/>
   </p:sldMasterIdLst>
+  <p:notesMasterIdLst>
+    <p:notesMasterId r:id="rId7"/>
+  </p:notesMasterIdLst>
   <p:sldIdLst>
     <p:sldId id="257" r:id="rId2"/>
     <p:sldId id="258" r:id="rId3"/>
     <p:sldId id="260" r:id="rId4"/>
     <p:sldId id="259" r:id="rId5"/>
+    <p:sldId id="261" r:id="rId6"/>
   </p:sldIdLst>
   <p:sldSz cx="12192000" cy="6858000"/>
   <p:notesSz cx="6858000" cy="9144000"/>
@@ -111,8 +115,529 @@
     <p:ext uri="{EFAFB233-063F-42B5-8137-9DF3F51BA10A}">
       <p15:sldGuideLst xmlns:p15="http://schemas.microsoft.com/office/powerpoint/2012/main"/>
     </p:ext>
+    <p:ext uri="{2D200454-40CA-4A62-9FC3-DE9A4176ACB9}">
+      <p15:notesGuideLst xmlns:p15="http://schemas.microsoft.com/office/powerpoint/2012/main"/>
+    </p:ext>
   </p:extLst>
 </p:presentation>
+</file>
+
+<file path=ppt/notesMasters/notesMaster1.xml><?xml version="1.0" encoding="utf-8"?>
+<p:notesMaster xmlns:a="http://schemas.openxmlformats.org/drawingml/2006/main" xmlns:r="http://schemas.openxmlformats.org/officeDocument/2006/relationships" xmlns:p="http://schemas.openxmlformats.org/presentationml/2006/main">
+  <p:cSld>
+    <p:bg>
+      <p:bgRef idx="1001">
+        <a:schemeClr val="bg1"/>
+      </p:bgRef>
+    </p:bg>
+    <p:spTree>
+      <p:nvGrpSpPr>
+        <p:cNvPr id="1" name=""/>
+        <p:cNvGrpSpPr/>
+        <p:nvPr/>
+      </p:nvGrpSpPr>
+      <p:grpSpPr>
+        <a:xfrm>
+          <a:off x="0" y="0"/>
+          <a:ext cx="0" cy="0"/>
+          <a:chOff x="0" y="0"/>
+          <a:chExt cx="0" cy="0"/>
+        </a:xfrm>
+      </p:grpSpPr>
+      <p:sp>
+        <p:nvSpPr>
+          <p:cNvPr id="2" name="Header Placeholder 1"/>
+          <p:cNvSpPr>
+            <a:spLocks noGrp="1"/>
+          </p:cNvSpPr>
+          <p:nvPr>
+            <p:ph type="hdr" sz="quarter"/>
+          </p:nvPr>
+        </p:nvSpPr>
+        <p:spPr>
+          <a:xfrm>
+            <a:off x="0" y="0"/>
+            <a:ext cx="2971800" cy="458788"/>
+          </a:xfrm>
+          <a:prstGeom prst="rect">
+            <a:avLst/>
+          </a:prstGeom>
+        </p:spPr>
+        <p:txBody>
+          <a:bodyPr vert="horz" lIns="91440" tIns="45720" rIns="91440" bIns="45720" rtlCol="0"/>
+          <a:lstStyle>
+            <a:lvl1pPr algn="l">
+              <a:defRPr sz="1200"/>
+            </a:lvl1pPr>
+          </a:lstStyle>
+          <a:p>
+            <a:endParaRPr lang="en-NL"/>
+          </a:p>
+        </p:txBody>
+      </p:sp>
+      <p:sp>
+        <p:nvSpPr>
+          <p:cNvPr id="3" name="Date Placeholder 2"/>
+          <p:cNvSpPr>
+            <a:spLocks noGrp="1"/>
+          </p:cNvSpPr>
+          <p:nvPr>
+            <p:ph type="dt" idx="1"/>
+          </p:nvPr>
+        </p:nvSpPr>
+        <p:spPr>
+          <a:xfrm>
+            <a:off x="3884613" y="0"/>
+            <a:ext cx="2971800" cy="458788"/>
+          </a:xfrm>
+          <a:prstGeom prst="rect">
+            <a:avLst/>
+          </a:prstGeom>
+        </p:spPr>
+        <p:txBody>
+          <a:bodyPr vert="horz" lIns="91440" tIns="45720" rIns="91440" bIns="45720" rtlCol="0"/>
+          <a:lstStyle>
+            <a:lvl1pPr algn="r">
+              <a:defRPr sz="1200"/>
+            </a:lvl1pPr>
+          </a:lstStyle>
+          <a:p>
+            <a:fld id="{54CD1AAC-DC99-8A4B-A528-6484AA9FCE4C}" type="datetimeFigureOut">
+              <a:rPr lang="en-NL" smtClean="0"/>
+              <a:t>08/04/2024</a:t>
+            </a:fld>
+            <a:endParaRPr lang="en-NL"/>
+          </a:p>
+        </p:txBody>
+      </p:sp>
+      <p:sp>
+        <p:nvSpPr>
+          <p:cNvPr id="4" name="Slide Image Placeholder 3"/>
+          <p:cNvSpPr>
+            <a:spLocks noGrp="1" noRot="1" noChangeAspect="1"/>
+          </p:cNvSpPr>
+          <p:nvPr>
+            <p:ph type="sldImg" idx="2"/>
+          </p:nvPr>
+        </p:nvSpPr>
+        <p:spPr>
+          <a:xfrm>
+            <a:off x="685800" y="1143000"/>
+            <a:ext cx="5486400" cy="3086100"/>
+          </a:xfrm>
+          <a:prstGeom prst="rect">
+            <a:avLst/>
+          </a:prstGeom>
+          <a:noFill/>
+          <a:ln w="12700">
+            <a:solidFill>
+              <a:prstClr val="black"/>
+            </a:solidFill>
+          </a:ln>
+        </p:spPr>
+        <p:txBody>
+          <a:bodyPr vert="horz" lIns="91440" tIns="45720" rIns="91440" bIns="45720" rtlCol="0" anchor="ctr"/>
+          <a:lstStyle/>
+          <a:p>
+            <a:endParaRPr lang="en-NL"/>
+          </a:p>
+        </p:txBody>
+      </p:sp>
+      <p:sp>
+        <p:nvSpPr>
+          <p:cNvPr id="5" name="Notes Placeholder 4"/>
+          <p:cNvSpPr>
+            <a:spLocks noGrp="1"/>
+          </p:cNvSpPr>
+          <p:nvPr>
+            <p:ph type="body" sz="quarter" idx="3"/>
+          </p:nvPr>
+        </p:nvSpPr>
+        <p:spPr>
+          <a:xfrm>
+            <a:off x="685800" y="4400550"/>
+            <a:ext cx="5486400" cy="3600450"/>
+          </a:xfrm>
+          <a:prstGeom prst="rect">
+            <a:avLst/>
+          </a:prstGeom>
+        </p:spPr>
+        <p:txBody>
+          <a:bodyPr vert="horz" lIns="91440" tIns="45720" rIns="91440" bIns="45720" rtlCol="0"/>
+          <a:lstStyle/>
+          <a:p>
+            <a:pPr lvl="0"/>
+            <a:r>
+              <a:rPr lang="en-US"/>
+              <a:t>Click to edit Master text styles</a:t>
+            </a:r>
+          </a:p>
+          <a:p>
+            <a:pPr lvl="1"/>
+            <a:r>
+              <a:rPr lang="en-US"/>
+              <a:t>Second level</a:t>
+            </a:r>
+          </a:p>
+          <a:p>
+            <a:pPr lvl="2"/>
+            <a:r>
+              <a:rPr lang="en-US"/>
+              <a:t>Third level</a:t>
+            </a:r>
+          </a:p>
+          <a:p>
+            <a:pPr lvl="3"/>
+            <a:r>
+              <a:rPr lang="en-US"/>
+              <a:t>Fourth level</a:t>
+            </a:r>
+          </a:p>
+          <a:p>
+            <a:pPr lvl="4"/>
+            <a:r>
+              <a:rPr lang="en-US"/>
+              <a:t>Fifth level</a:t>
+            </a:r>
+            <a:endParaRPr lang="en-NL"/>
+          </a:p>
+        </p:txBody>
+      </p:sp>
+      <p:sp>
+        <p:nvSpPr>
+          <p:cNvPr id="6" name="Footer Placeholder 5"/>
+          <p:cNvSpPr>
+            <a:spLocks noGrp="1"/>
+          </p:cNvSpPr>
+          <p:nvPr>
+            <p:ph type="ftr" sz="quarter" idx="4"/>
+          </p:nvPr>
+        </p:nvSpPr>
+        <p:spPr>
+          <a:xfrm>
+            <a:off x="0" y="8685213"/>
+            <a:ext cx="2971800" cy="458787"/>
+          </a:xfrm>
+          <a:prstGeom prst="rect">
+            <a:avLst/>
+          </a:prstGeom>
+        </p:spPr>
+        <p:txBody>
+          <a:bodyPr vert="horz" lIns="91440" tIns="45720" rIns="91440" bIns="45720" rtlCol="0" anchor="b"/>
+          <a:lstStyle>
+            <a:lvl1pPr algn="l">
+              <a:defRPr sz="1200"/>
+            </a:lvl1pPr>
+          </a:lstStyle>
+          <a:p>
+            <a:endParaRPr lang="en-NL"/>
+          </a:p>
+        </p:txBody>
+      </p:sp>
+      <p:sp>
+        <p:nvSpPr>
+          <p:cNvPr id="7" name="Slide Number Placeholder 6"/>
+          <p:cNvSpPr>
+            <a:spLocks noGrp="1"/>
+          </p:cNvSpPr>
+          <p:nvPr>
+            <p:ph type="sldNum" sz="quarter" idx="5"/>
+          </p:nvPr>
+        </p:nvSpPr>
+        <p:spPr>
+          <a:xfrm>
+            <a:off x="3884613" y="8685213"/>
+            <a:ext cx="2971800" cy="458787"/>
+          </a:xfrm>
+          <a:prstGeom prst="rect">
+            <a:avLst/>
+          </a:prstGeom>
+        </p:spPr>
+        <p:txBody>
+          <a:bodyPr vert="horz" lIns="91440" tIns="45720" rIns="91440" bIns="45720" rtlCol="0" anchor="b"/>
+          <a:lstStyle>
+            <a:lvl1pPr algn="r">
+              <a:defRPr sz="1200"/>
+            </a:lvl1pPr>
+          </a:lstStyle>
+          <a:p>
+            <a:fld id="{D6154CB2-E6C1-094F-A976-1FF8C50CEBEA}" type="slidenum">
+              <a:rPr lang="en-NL" smtClean="0"/>
+              <a:t>‹#›</a:t>
+            </a:fld>
+            <a:endParaRPr lang="en-NL"/>
+          </a:p>
+        </p:txBody>
+      </p:sp>
+    </p:spTree>
+    <p:extLst>
+      <p:ext uri="{BB962C8B-B14F-4D97-AF65-F5344CB8AC3E}">
+        <p14:creationId xmlns:p14="http://schemas.microsoft.com/office/powerpoint/2010/main" val="3785780738"/>
+      </p:ext>
+    </p:extLst>
+  </p:cSld>
+  <p:clrMap bg1="lt1" tx1="dk1" bg2="lt2" tx2="dk2" accent1="accent1" accent2="accent2" accent3="accent3" accent4="accent4" accent5="accent5" accent6="accent6" hlink="hlink" folHlink="folHlink"/>
+  <p:notesStyle>
+    <a:lvl1pPr marL="0" algn="l" defTabSz="914400" rtl="0" eaLnBrk="1" latinLnBrk="0" hangingPunct="1">
+      <a:defRPr sz="1200" kern="1200">
+        <a:solidFill>
+          <a:schemeClr val="tx1"/>
+        </a:solidFill>
+        <a:latin typeface="+mn-lt"/>
+        <a:ea typeface="+mn-ea"/>
+        <a:cs typeface="+mn-cs"/>
+      </a:defRPr>
+    </a:lvl1pPr>
+    <a:lvl2pPr marL="457200" algn="l" defTabSz="914400" rtl="0" eaLnBrk="1" latinLnBrk="0" hangingPunct="1">
+      <a:defRPr sz="1200" kern="1200">
+        <a:solidFill>
+          <a:schemeClr val="tx1"/>
+        </a:solidFill>
+        <a:latin typeface="+mn-lt"/>
+        <a:ea typeface="+mn-ea"/>
+        <a:cs typeface="+mn-cs"/>
+      </a:defRPr>
+    </a:lvl2pPr>
+    <a:lvl3pPr marL="914400" algn="l" defTabSz="914400" rtl="0" eaLnBrk="1" latinLnBrk="0" hangingPunct="1">
+      <a:defRPr sz="1200" kern="1200">
+        <a:solidFill>
+          <a:schemeClr val="tx1"/>
+        </a:solidFill>
+        <a:latin typeface="+mn-lt"/>
+        <a:ea typeface="+mn-ea"/>
+        <a:cs typeface="+mn-cs"/>
+      </a:defRPr>
+    </a:lvl3pPr>
+    <a:lvl4pPr marL="1371600" algn="l" defTabSz="914400" rtl="0" eaLnBrk="1" latinLnBrk="0" hangingPunct="1">
+      <a:defRPr sz="1200" kern="1200">
+        <a:solidFill>
+          <a:schemeClr val="tx1"/>
+        </a:solidFill>
+        <a:latin typeface="+mn-lt"/>
+        <a:ea typeface="+mn-ea"/>
+        <a:cs typeface="+mn-cs"/>
+      </a:defRPr>
+    </a:lvl4pPr>
+    <a:lvl5pPr marL="1828800" algn="l" defTabSz="914400" rtl="0" eaLnBrk="1" latinLnBrk="0" hangingPunct="1">
+      <a:defRPr sz="1200" kern="1200">
+        <a:solidFill>
+          <a:schemeClr val="tx1"/>
+        </a:solidFill>
+        <a:latin typeface="+mn-lt"/>
+        <a:ea typeface="+mn-ea"/>
+        <a:cs typeface="+mn-cs"/>
+      </a:defRPr>
+    </a:lvl5pPr>
+    <a:lvl6pPr marL="2286000" algn="l" defTabSz="914400" rtl="0" eaLnBrk="1" latinLnBrk="0" hangingPunct="1">
+      <a:defRPr sz="1200" kern="1200">
+        <a:solidFill>
+          <a:schemeClr val="tx1"/>
+        </a:solidFill>
+        <a:latin typeface="+mn-lt"/>
+        <a:ea typeface="+mn-ea"/>
+        <a:cs typeface="+mn-cs"/>
+      </a:defRPr>
+    </a:lvl6pPr>
+    <a:lvl7pPr marL="2743200" algn="l" defTabSz="914400" rtl="0" eaLnBrk="1" latinLnBrk="0" hangingPunct="1">
+      <a:defRPr sz="1200" kern="1200">
+        <a:solidFill>
+          <a:schemeClr val="tx1"/>
+        </a:solidFill>
+        <a:latin typeface="+mn-lt"/>
+        <a:ea typeface="+mn-ea"/>
+        <a:cs typeface="+mn-cs"/>
+      </a:defRPr>
+    </a:lvl7pPr>
+    <a:lvl8pPr marL="3200400" algn="l" defTabSz="914400" rtl="0" eaLnBrk="1" latinLnBrk="0" hangingPunct="1">
+      <a:defRPr sz="1200" kern="1200">
+        <a:solidFill>
+          <a:schemeClr val="tx1"/>
+        </a:solidFill>
+        <a:latin typeface="+mn-lt"/>
+        <a:ea typeface="+mn-ea"/>
+        <a:cs typeface="+mn-cs"/>
+      </a:defRPr>
+    </a:lvl8pPr>
+    <a:lvl9pPr marL="3657600" algn="l" defTabSz="914400" rtl="0" eaLnBrk="1" latinLnBrk="0" hangingPunct="1">
+      <a:defRPr sz="1200" kern="1200">
+        <a:solidFill>
+          <a:schemeClr val="tx1"/>
+        </a:solidFill>
+        <a:latin typeface="+mn-lt"/>
+        <a:ea typeface="+mn-ea"/>
+        <a:cs typeface="+mn-cs"/>
+      </a:defRPr>
+    </a:lvl9pPr>
+  </p:notesStyle>
+</p:notesMaster>
+</file>
+
+<file path=ppt/notesSlides/notesSlide1.xml><?xml version="1.0" encoding="utf-8"?>
+<p:notes xmlns:a="http://schemas.openxmlformats.org/drawingml/2006/main" xmlns:r="http://schemas.openxmlformats.org/officeDocument/2006/relationships" xmlns:p="http://schemas.openxmlformats.org/presentationml/2006/main">
+  <p:cSld>
+    <p:spTree>
+      <p:nvGrpSpPr>
+        <p:cNvPr id="1" name=""/>
+        <p:cNvGrpSpPr/>
+        <p:nvPr/>
+      </p:nvGrpSpPr>
+      <p:grpSpPr>
+        <a:xfrm>
+          <a:off x="0" y="0"/>
+          <a:ext cx="0" cy="0"/>
+          <a:chOff x="0" y="0"/>
+          <a:chExt cx="0" cy="0"/>
+        </a:xfrm>
+      </p:grpSpPr>
+      <p:sp>
+        <p:nvSpPr>
+          <p:cNvPr id="2" name="Slide Image Placeholder 1"/>
+          <p:cNvSpPr>
+            <a:spLocks noGrp="1" noRot="1" noChangeAspect="1"/>
+          </p:cNvSpPr>
+          <p:nvPr>
+            <p:ph type="sldImg"/>
+          </p:nvPr>
+        </p:nvSpPr>
+        <p:spPr/>
+      </p:sp>
+      <p:sp>
+        <p:nvSpPr>
+          <p:cNvPr id="3" name="Notes Placeholder 2"/>
+          <p:cNvSpPr>
+            <a:spLocks noGrp="1"/>
+          </p:cNvSpPr>
+          <p:nvPr>
+            <p:ph type="body" idx="1"/>
+          </p:nvPr>
+        </p:nvSpPr>
+        <p:spPr/>
+        <p:txBody>
+          <a:bodyPr/>
+          <a:lstStyle/>
+          <a:p>
+            <a:endParaRPr lang="en-NL"/>
+          </a:p>
+        </p:txBody>
+      </p:sp>
+      <p:sp>
+        <p:nvSpPr>
+          <p:cNvPr id="4" name="Slide Number Placeholder 3"/>
+          <p:cNvSpPr>
+            <a:spLocks noGrp="1"/>
+          </p:cNvSpPr>
+          <p:nvPr>
+            <p:ph type="sldNum" sz="quarter" idx="5"/>
+          </p:nvPr>
+        </p:nvSpPr>
+        <p:spPr/>
+        <p:txBody>
+          <a:bodyPr/>
+          <a:lstStyle/>
+          <a:p>
+            <a:fld id="{D6154CB2-E6C1-094F-A976-1FF8C50CEBEA}" type="slidenum">
+              <a:rPr lang="en-NL" smtClean="0"/>
+              <a:t>1</a:t>
+            </a:fld>
+            <a:endParaRPr lang="en-NL"/>
+          </a:p>
+        </p:txBody>
+      </p:sp>
+    </p:spTree>
+    <p:extLst>
+      <p:ext uri="{BB962C8B-B14F-4D97-AF65-F5344CB8AC3E}">
+        <p14:creationId xmlns:p14="http://schemas.microsoft.com/office/powerpoint/2010/main" val="2501348084"/>
+      </p:ext>
+    </p:extLst>
+  </p:cSld>
+  <p:clrMapOvr>
+    <a:masterClrMapping/>
+  </p:clrMapOvr>
+</p:notes>
+</file>
+
+<file path=ppt/notesSlides/notesSlide2.xml><?xml version="1.0" encoding="utf-8"?>
+<p:notes xmlns:a="http://schemas.openxmlformats.org/drawingml/2006/main" xmlns:r="http://schemas.openxmlformats.org/officeDocument/2006/relationships" xmlns:p="http://schemas.openxmlformats.org/presentationml/2006/main">
+  <p:cSld>
+    <p:spTree>
+      <p:nvGrpSpPr>
+        <p:cNvPr id="1" name=""/>
+        <p:cNvGrpSpPr/>
+        <p:nvPr/>
+      </p:nvGrpSpPr>
+      <p:grpSpPr>
+        <a:xfrm>
+          <a:off x="0" y="0"/>
+          <a:ext cx="0" cy="0"/>
+          <a:chOff x="0" y="0"/>
+          <a:chExt cx="0" cy="0"/>
+        </a:xfrm>
+      </p:grpSpPr>
+      <p:sp>
+        <p:nvSpPr>
+          <p:cNvPr id="2" name="Slide Image Placeholder 1"/>
+          <p:cNvSpPr>
+            <a:spLocks noGrp="1" noRot="1" noChangeAspect="1"/>
+          </p:cNvSpPr>
+          <p:nvPr>
+            <p:ph type="sldImg"/>
+          </p:nvPr>
+        </p:nvSpPr>
+        <p:spPr/>
+      </p:sp>
+      <p:sp>
+        <p:nvSpPr>
+          <p:cNvPr id="3" name="Notes Placeholder 2"/>
+          <p:cNvSpPr>
+            <a:spLocks noGrp="1"/>
+          </p:cNvSpPr>
+          <p:nvPr>
+            <p:ph type="body" idx="1"/>
+          </p:nvPr>
+        </p:nvSpPr>
+        <p:spPr/>
+        <p:txBody>
+          <a:bodyPr/>
+          <a:lstStyle/>
+          <a:p>
+            <a:endParaRPr lang="en-NL"/>
+          </a:p>
+        </p:txBody>
+      </p:sp>
+      <p:sp>
+        <p:nvSpPr>
+          <p:cNvPr id="4" name="Slide Number Placeholder 3"/>
+          <p:cNvSpPr>
+            <a:spLocks noGrp="1"/>
+          </p:cNvSpPr>
+          <p:nvPr>
+            <p:ph type="sldNum" sz="quarter" idx="5"/>
+          </p:nvPr>
+        </p:nvSpPr>
+        <p:spPr/>
+        <p:txBody>
+          <a:bodyPr/>
+          <a:lstStyle/>
+          <a:p>
+            <a:fld id="{D6154CB2-E6C1-094F-A976-1FF8C50CEBEA}" type="slidenum">
+              <a:rPr lang="en-NL" smtClean="0"/>
+              <a:t>2</a:t>
+            </a:fld>
+            <a:endParaRPr lang="en-NL"/>
+          </a:p>
+        </p:txBody>
+      </p:sp>
+    </p:spTree>
+    <p:extLst>
+      <p:ext uri="{BB962C8B-B14F-4D97-AF65-F5344CB8AC3E}">
+        <p14:creationId xmlns:p14="http://schemas.microsoft.com/office/powerpoint/2010/main" val="317839452"/>
+      </p:ext>
+    </p:extLst>
+  </p:cSld>
+  <p:clrMapOvr>
+    <a:masterClrMapping/>
+  </p:clrMapOvr>
+</p:notes>
 </file>
 
 <file path=ppt/slideLayouts/slideLayout1.xml><?xml version="1.0" encoding="utf-8"?>
@@ -264,7 +789,7 @@
           <a:p>
             <a:fld id="{291856B5-8E29-B64F-9105-14345E3ED281}" type="datetimeFigureOut">
               <a:rPr lang="en-NL" smtClean="0"/>
-              <a:t>06/11/2023</a:t>
+              <a:t>08/04/2024</a:t>
             </a:fld>
             <a:endParaRPr lang="en-NL"/>
           </a:p>
@@ -464,7 +989,7 @@
           <a:p>
             <a:fld id="{291856B5-8E29-B64F-9105-14345E3ED281}" type="datetimeFigureOut">
               <a:rPr lang="en-NL" smtClean="0"/>
-              <a:t>06/11/2023</a:t>
+              <a:t>08/04/2024</a:t>
             </a:fld>
             <a:endParaRPr lang="en-NL"/>
           </a:p>
@@ -674,7 +1199,7 @@
           <a:p>
             <a:fld id="{291856B5-8E29-B64F-9105-14345E3ED281}" type="datetimeFigureOut">
               <a:rPr lang="en-NL" smtClean="0"/>
-              <a:t>06/11/2023</a:t>
+              <a:t>08/04/2024</a:t>
             </a:fld>
             <a:endParaRPr lang="en-NL"/>
           </a:p>
@@ -874,7 +1399,7 @@
           <a:p>
             <a:fld id="{291856B5-8E29-B64F-9105-14345E3ED281}" type="datetimeFigureOut">
               <a:rPr lang="en-NL" smtClean="0"/>
-              <a:t>06/11/2023</a:t>
+              <a:t>08/04/2024</a:t>
             </a:fld>
             <a:endParaRPr lang="en-NL"/>
           </a:p>
@@ -1150,7 +1675,7 @@
           <a:p>
             <a:fld id="{291856B5-8E29-B64F-9105-14345E3ED281}" type="datetimeFigureOut">
               <a:rPr lang="en-NL" smtClean="0"/>
-              <a:t>06/11/2023</a:t>
+              <a:t>08/04/2024</a:t>
             </a:fld>
             <a:endParaRPr lang="en-NL"/>
           </a:p>
@@ -1418,7 +1943,7 @@
           <a:p>
             <a:fld id="{291856B5-8E29-B64F-9105-14345E3ED281}" type="datetimeFigureOut">
               <a:rPr lang="en-NL" smtClean="0"/>
-              <a:t>06/11/2023</a:t>
+              <a:t>08/04/2024</a:t>
             </a:fld>
             <a:endParaRPr lang="en-NL"/>
           </a:p>
@@ -1833,7 +2358,7 @@
           <a:p>
             <a:fld id="{291856B5-8E29-B64F-9105-14345E3ED281}" type="datetimeFigureOut">
               <a:rPr lang="en-NL" smtClean="0"/>
-              <a:t>06/11/2023</a:t>
+              <a:t>08/04/2024</a:t>
             </a:fld>
             <a:endParaRPr lang="en-NL"/>
           </a:p>
@@ -1975,7 +2500,7 @@
           <a:p>
             <a:fld id="{291856B5-8E29-B64F-9105-14345E3ED281}" type="datetimeFigureOut">
               <a:rPr lang="en-NL" smtClean="0"/>
-              <a:t>06/11/2023</a:t>
+              <a:t>08/04/2024</a:t>
             </a:fld>
             <a:endParaRPr lang="en-NL"/>
           </a:p>
@@ -2088,7 +2613,7 @@
           <a:p>
             <a:fld id="{291856B5-8E29-B64F-9105-14345E3ED281}" type="datetimeFigureOut">
               <a:rPr lang="en-NL" smtClean="0"/>
-              <a:t>06/11/2023</a:t>
+              <a:t>08/04/2024</a:t>
             </a:fld>
             <a:endParaRPr lang="en-NL"/>
           </a:p>
@@ -2401,7 +2926,7 @@
           <a:p>
             <a:fld id="{291856B5-8E29-B64F-9105-14345E3ED281}" type="datetimeFigureOut">
               <a:rPr lang="en-NL" smtClean="0"/>
-              <a:t>06/11/2023</a:t>
+              <a:t>08/04/2024</a:t>
             </a:fld>
             <a:endParaRPr lang="en-NL"/>
           </a:p>
@@ -2690,7 +3215,7 @@
           <a:p>
             <a:fld id="{291856B5-8E29-B64F-9105-14345E3ED281}" type="datetimeFigureOut">
               <a:rPr lang="en-NL" smtClean="0"/>
-              <a:t>06/11/2023</a:t>
+              <a:t>08/04/2024</a:t>
             </a:fld>
             <a:endParaRPr lang="en-NL"/>
           </a:p>
@@ -2933,7 +3458,7 @@
           <a:p>
             <a:fld id="{291856B5-8E29-B64F-9105-14345E3ED281}" type="datetimeFigureOut">
               <a:rPr lang="en-NL" smtClean="0"/>
-              <a:t>06/11/2023</a:t>
+              <a:t>08/04/2024</a:t>
             </a:fld>
             <a:endParaRPr lang="en-NL"/>
           </a:p>
@@ -7874,6 +8399,880 @@
 </p:sld>
 </file>
 
+<file path=ppt/slides/slide5.xml><?xml version="1.0" encoding="utf-8"?>
+<p:sld xmlns:a="http://schemas.openxmlformats.org/drawingml/2006/main" xmlns:r="http://schemas.openxmlformats.org/officeDocument/2006/relationships" xmlns:p="http://schemas.openxmlformats.org/presentationml/2006/main">
+  <p:cSld>
+    <p:spTree>
+      <p:nvGrpSpPr>
+        <p:cNvPr id="1" name=""/>
+        <p:cNvGrpSpPr/>
+        <p:nvPr/>
+      </p:nvGrpSpPr>
+      <p:grpSpPr>
+        <a:xfrm>
+          <a:off x="0" y="0"/>
+          <a:ext cx="0" cy="0"/>
+          <a:chOff x="0" y="0"/>
+          <a:chExt cx="0" cy="0"/>
+        </a:xfrm>
+      </p:grpSpPr>
+      <p:sp>
+        <p:nvSpPr>
+          <p:cNvPr id="3" name="TextBox 2">
+            <a:extLst>
+              <a:ext uri="{FF2B5EF4-FFF2-40B4-BE49-F238E27FC236}">
+                <a16:creationId xmlns:a16="http://schemas.microsoft.com/office/drawing/2014/main" id="{2FC40BCF-9D6B-D0E8-86FD-5E925B881345}"/>
+              </a:ext>
+            </a:extLst>
+          </p:cNvPr>
+          <p:cNvSpPr txBox="1"/>
+          <p:nvPr/>
+        </p:nvSpPr>
+        <p:spPr>
+          <a:xfrm>
+            <a:off x="8456958" y="3961376"/>
+            <a:ext cx="553357" cy="369332"/>
+          </a:xfrm>
+          <a:prstGeom prst="rect">
+            <a:avLst/>
+          </a:prstGeom>
+          <a:noFill/>
+        </p:spPr>
+        <p:txBody>
+          <a:bodyPr wrap="none" rtlCol="0">
+            <a:spAutoFit/>
+          </a:bodyPr>
+          <a:lstStyle/>
+          <a:p>
+            <a:r>
+              <a:rPr lang="en-NL" dirty="0"/>
+              <a:t>A$P</a:t>
+            </a:r>
+          </a:p>
+        </p:txBody>
+      </p:sp>
+      <p:cxnSp>
+        <p:nvCxnSpPr>
+          <p:cNvPr id="5" name="Straight Connector 4">
+            <a:extLst>
+              <a:ext uri="{FF2B5EF4-FFF2-40B4-BE49-F238E27FC236}">
+                <a16:creationId xmlns:a16="http://schemas.microsoft.com/office/drawing/2014/main" id="{B8358649-F31A-2821-7271-3C4F96807E14}"/>
+              </a:ext>
+            </a:extLst>
+          </p:cNvPr>
+          <p:cNvCxnSpPr>
+            <a:cxnSpLocks/>
+            <a:stCxn id="18" idx="6"/>
+            <a:endCxn id="28" idx="1"/>
+          </p:cNvCxnSpPr>
+          <p:nvPr/>
+        </p:nvCxnSpPr>
+        <p:spPr>
+          <a:xfrm flipV="1">
+            <a:off x="7261291" y="2830880"/>
+            <a:ext cx="1195667" cy="9629"/>
+          </a:xfrm>
+          <a:prstGeom prst="line">
+            <a:avLst/>
+          </a:prstGeom>
+        </p:spPr>
+        <p:style>
+          <a:lnRef idx="1">
+            <a:schemeClr val="accent1"/>
+          </a:lnRef>
+          <a:fillRef idx="0">
+            <a:schemeClr val="accent1"/>
+          </a:fillRef>
+          <a:effectRef idx="0">
+            <a:schemeClr val="accent1"/>
+          </a:effectRef>
+          <a:fontRef idx="minor">
+            <a:schemeClr val="tx1"/>
+          </a:fontRef>
+        </p:style>
+      </p:cxnSp>
+      <p:sp>
+        <p:nvSpPr>
+          <p:cNvPr id="6" name="Oval 5">
+            <a:extLst>
+              <a:ext uri="{FF2B5EF4-FFF2-40B4-BE49-F238E27FC236}">
+                <a16:creationId xmlns:a16="http://schemas.microsoft.com/office/drawing/2014/main" id="{FB46E386-F13E-F233-75D1-AF8D5BE2531C}"/>
+              </a:ext>
+            </a:extLst>
+          </p:cNvPr>
+          <p:cNvSpPr/>
+          <p:nvPr/>
+        </p:nvSpPr>
+        <p:spPr>
+          <a:xfrm>
+            <a:off x="704851" y="1586818"/>
+            <a:ext cx="580767" cy="580767"/>
+          </a:xfrm>
+          <a:prstGeom prst="ellipse">
+            <a:avLst/>
+          </a:prstGeom>
+          <a:noFill/>
+        </p:spPr>
+        <p:style>
+          <a:lnRef idx="2">
+            <a:schemeClr val="accent1">
+              <a:shade val="50000"/>
+            </a:schemeClr>
+          </a:lnRef>
+          <a:fillRef idx="1">
+            <a:schemeClr val="accent1"/>
+          </a:fillRef>
+          <a:effectRef idx="0">
+            <a:schemeClr val="accent1"/>
+          </a:effectRef>
+          <a:fontRef idx="minor">
+            <a:schemeClr val="lt1"/>
+          </a:fontRef>
+        </p:style>
+        <p:txBody>
+          <a:bodyPr rtlCol="0" anchor="ctr"/>
+          <a:lstStyle/>
+          <a:p>
+            <a:pPr algn="ctr"/>
+            <a:r>
+              <a:rPr lang="en-NL" dirty="0">
+                <a:solidFill>
+                  <a:schemeClr val="tx1"/>
+                </a:solidFill>
+              </a:rPr>
+              <a:t>A</a:t>
+            </a:r>
+          </a:p>
+        </p:txBody>
+      </p:sp>
+      <p:cxnSp>
+        <p:nvCxnSpPr>
+          <p:cNvPr id="12" name="Straight Connector 11">
+            <a:extLst>
+              <a:ext uri="{FF2B5EF4-FFF2-40B4-BE49-F238E27FC236}">
+                <a16:creationId xmlns:a16="http://schemas.microsoft.com/office/drawing/2014/main" id="{C6BDFFD4-E08E-BCD8-128C-4B5C66D37834}"/>
+              </a:ext>
+            </a:extLst>
+          </p:cNvPr>
+          <p:cNvCxnSpPr>
+            <a:cxnSpLocks/>
+            <a:stCxn id="6" idx="4"/>
+          </p:cNvCxnSpPr>
+          <p:nvPr/>
+        </p:nvCxnSpPr>
+        <p:spPr>
+          <a:xfrm flipH="1">
+            <a:off x="537328" y="2167585"/>
+            <a:ext cx="457907" cy="462493"/>
+          </a:xfrm>
+          <a:prstGeom prst="line">
+            <a:avLst/>
+          </a:prstGeom>
+          <a:ln>
+            <a:prstDash val="lgDash"/>
+          </a:ln>
+        </p:spPr>
+        <p:style>
+          <a:lnRef idx="1">
+            <a:schemeClr val="accent1"/>
+          </a:lnRef>
+          <a:fillRef idx="0">
+            <a:schemeClr val="accent1"/>
+          </a:fillRef>
+          <a:effectRef idx="0">
+            <a:schemeClr val="accent1"/>
+          </a:effectRef>
+          <a:fontRef idx="minor">
+            <a:schemeClr val="tx1"/>
+          </a:fontRef>
+        </p:style>
+      </p:cxnSp>
+      <p:cxnSp>
+        <p:nvCxnSpPr>
+          <p:cNvPr id="13" name="Straight Connector 12">
+            <a:extLst>
+              <a:ext uri="{FF2B5EF4-FFF2-40B4-BE49-F238E27FC236}">
+                <a16:creationId xmlns:a16="http://schemas.microsoft.com/office/drawing/2014/main" id="{5980D39F-BD84-B37B-88DE-07A8BA8D155C}"/>
+              </a:ext>
+            </a:extLst>
+          </p:cNvPr>
+          <p:cNvCxnSpPr>
+            <a:cxnSpLocks/>
+            <a:stCxn id="2" idx="6"/>
+            <a:endCxn id="3" idx="1"/>
+          </p:cNvCxnSpPr>
+          <p:nvPr/>
+        </p:nvCxnSpPr>
+        <p:spPr>
+          <a:xfrm>
+            <a:off x="7261290" y="4120170"/>
+            <a:ext cx="1195668" cy="25872"/>
+          </a:xfrm>
+          <a:prstGeom prst="line">
+            <a:avLst/>
+          </a:prstGeom>
+        </p:spPr>
+        <p:style>
+          <a:lnRef idx="1">
+            <a:schemeClr val="accent1"/>
+          </a:lnRef>
+          <a:fillRef idx="0">
+            <a:schemeClr val="accent1"/>
+          </a:fillRef>
+          <a:effectRef idx="0">
+            <a:schemeClr val="accent1"/>
+          </a:effectRef>
+          <a:fontRef idx="minor">
+            <a:schemeClr val="tx1"/>
+          </a:fontRef>
+        </p:style>
+      </p:cxnSp>
+      <p:sp>
+        <p:nvSpPr>
+          <p:cNvPr id="28" name="TextBox 27">
+            <a:extLst>
+              <a:ext uri="{FF2B5EF4-FFF2-40B4-BE49-F238E27FC236}">
+                <a16:creationId xmlns:a16="http://schemas.microsoft.com/office/drawing/2014/main" id="{EBEDF0B6-64BA-0058-DEAB-ABA2B5050BB4}"/>
+              </a:ext>
+            </a:extLst>
+          </p:cNvPr>
+          <p:cNvSpPr txBox="1"/>
+          <p:nvPr/>
+        </p:nvSpPr>
+        <p:spPr>
+          <a:xfrm>
+            <a:off x="8456958" y="2646214"/>
+            <a:ext cx="616451" cy="369332"/>
+          </a:xfrm>
+          <a:prstGeom prst="rect">
+            <a:avLst/>
+          </a:prstGeom>
+          <a:noFill/>
+        </p:spPr>
+        <p:txBody>
+          <a:bodyPr wrap="none" rtlCol="0">
+            <a:spAutoFit/>
+          </a:bodyPr>
+          <a:lstStyle/>
+          <a:p>
+            <a:r>
+              <a:rPr lang="en-NL" dirty="0"/>
+              <a:t>A$P’</a:t>
+            </a:r>
+          </a:p>
+        </p:txBody>
+      </p:sp>
+      <p:sp>
+        <p:nvSpPr>
+          <p:cNvPr id="8" name="Rectangle 7">
+            <a:extLst>
+              <a:ext uri="{FF2B5EF4-FFF2-40B4-BE49-F238E27FC236}">
+                <a16:creationId xmlns:a16="http://schemas.microsoft.com/office/drawing/2014/main" id="{1E974B3F-F065-24B8-9025-4032F866CB4C}"/>
+              </a:ext>
+            </a:extLst>
+          </p:cNvPr>
+          <p:cNvSpPr/>
+          <p:nvPr/>
+        </p:nvSpPr>
+        <p:spPr>
+          <a:xfrm>
+            <a:off x="3503438" y="4295207"/>
+            <a:ext cx="612000" cy="612000"/>
+          </a:xfrm>
+          <a:prstGeom prst="rect">
+            <a:avLst/>
+          </a:prstGeom>
+          <a:noFill/>
+        </p:spPr>
+        <p:style>
+          <a:lnRef idx="2">
+            <a:schemeClr val="accent1">
+              <a:shade val="50000"/>
+            </a:schemeClr>
+          </a:lnRef>
+          <a:fillRef idx="1">
+            <a:schemeClr val="accent1"/>
+          </a:fillRef>
+          <a:effectRef idx="0">
+            <a:schemeClr val="accent1"/>
+          </a:effectRef>
+          <a:fontRef idx="minor">
+            <a:schemeClr val="lt1"/>
+          </a:fontRef>
+        </p:style>
+        <p:txBody>
+          <a:bodyPr rtlCol="0" anchor="ctr"/>
+          <a:lstStyle/>
+          <a:p>
+            <a:pPr algn="ctr"/>
+            <a:r>
+              <a:rPr lang="en-NL" dirty="0">
+                <a:solidFill>
+                  <a:schemeClr val="tx1"/>
+                </a:solidFill>
+              </a:rPr>
+              <a:t>C</a:t>
+            </a:r>
+          </a:p>
+        </p:txBody>
+      </p:sp>
+      <p:cxnSp>
+        <p:nvCxnSpPr>
+          <p:cNvPr id="15" name="Straight Connector 14">
+            <a:extLst>
+              <a:ext uri="{FF2B5EF4-FFF2-40B4-BE49-F238E27FC236}">
+                <a16:creationId xmlns:a16="http://schemas.microsoft.com/office/drawing/2014/main" id="{B6589D37-8265-6789-FD19-A701280059F7}"/>
+              </a:ext>
+            </a:extLst>
+          </p:cNvPr>
+          <p:cNvCxnSpPr>
+            <a:cxnSpLocks/>
+            <a:stCxn id="8" idx="3"/>
+          </p:cNvCxnSpPr>
+          <p:nvPr/>
+        </p:nvCxnSpPr>
+        <p:spPr>
+          <a:xfrm flipV="1">
+            <a:off x="4115438" y="3509971"/>
+            <a:ext cx="1544481" cy="1091236"/>
+          </a:xfrm>
+          <a:prstGeom prst="line">
+            <a:avLst/>
+          </a:prstGeom>
+        </p:spPr>
+        <p:style>
+          <a:lnRef idx="1">
+            <a:schemeClr val="accent1"/>
+          </a:lnRef>
+          <a:fillRef idx="0">
+            <a:schemeClr val="accent1"/>
+          </a:fillRef>
+          <a:effectRef idx="0">
+            <a:schemeClr val="accent1"/>
+          </a:effectRef>
+          <a:fontRef idx="minor">
+            <a:schemeClr val="tx1"/>
+          </a:fontRef>
+        </p:style>
+      </p:cxnSp>
+      <p:sp>
+        <p:nvSpPr>
+          <p:cNvPr id="18" name="Oval 17">
+            <a:extLst>
+              <a:ext uri="{FF2B5EF4-FFF2-40B4-BE49-F238E27FC236}">
+                <a16:creationId xmlns:a16="http://schemas.microsoft.com/office/drawing/2014/main" id="{125D3B6E-5E42-DD98-7FF7-A9B8B4655C5E}"/>
+              </a:ext>
+            </a:extLst>
+          </p:cNvPr>
+          <p:cNvSpPr/>
+          <p:nvPr/>
+        </p:nvSpPr>
+        <p:spPr>
+          <a:xfrm>
+            <a:off x="6680524" y="2550125"/>
+            <a:ext cx="580767" cy="580767"/>
+          </a:xfrm>
+          <a:prstGeom prst="ellipse">
+            <a:avLst/>
+          </a:prstGeom>
+          <a:noFill/>
+        </p:spPr>
+        <p:style>
+          <a:lnRef idx="2">
+            <a:schemeClr val="accent1">
+              <a:shade val="50000"/>
+            </a:schemeClr>
+          </a:lnRef>
+          <a:fillRef idx="1">
+            <a:schemeClr val="accent1"/>
+          </a:fillRef>
+          <a:effectRef idx="0">
+            <a:schemeClr val="accent1"/>
+          </a:effectRef>
+          <a:fontRef idx="minor">
+            <a:schemeClr val="lt1"/>
+          </a:fontRef>
+        </p:style>
+        <p:txBody>
+          <a:bodyPr rtlCol="0" anchor="ctr"/>
+          <a:lstStyle/>
+          <a:p>
+            <a:pPr algn="ctr"/>
+            <a:r>
+              <a:rPr lang="en-NL" dirty="0">
+                <a:solidFill>
+                  <a:schemeClr val="tx1"/>
+                </a:solidFill>
+              </a:rPr>
+              <a:t>F</a:t>
+            </a:r>
+          </a:p>
+        </p:txBody>
+      </p:sp>
+      <p:sp>
+        <p:nvSpPr>
+          <p:cNvPr id="19" name="Rectangle 18">
+            <a:extLst>
+              <a:ext uri="{FF2B5EF4-FFF2-40B4-BE49-F238E27FC236}">
+                <a16:creationId xmlns:a16="http://schemas.microsoft.com/office/drawing/2014/main" id="{C5235CE5-ED4C-06AD-66EE-4CF5CC400B24}"/>
+              </a:ext>
+            </a:extLst>
+          </p:cNvPr>
+          <p:cNvSpPr/>
+          <p:nvPr/>
+        </p:nvSpPr>
+        <p:spPr>
+          <a:xfrm>
+            <a:off x="3503438" y="3015546"/>
+            <a:ext cx="612000" cy="612000"/>
+          </a:xfrm>
+          <a:prstGeom prst="rect">
+            <a:avLst/>
+          </a:prstGeom>
+          <a:noFill/>
+        </p:spPr>
+        <p:style>
+          <a:lnRef idx="2">
+            <a:schemeClr val="accent1">
+              <a:shade val="50000"/>
+            </a:schemeClr>
+          </a:lnRef>
+          <a:fillRef idx="1">
+            <a:schemeClr val="accent1"/>
+          </a:fillRef>
+          <a:effectRef idx="0">
+            <a:schemeClr val="accent1"/>
+          </a:effectRef>
+          <a:fontRef idx="minor">
+            <a:schemeClr val="lt1"/>
+          </a:fontRef>
+        </p:style>
+        <p:txBody>
+          <a:bodyPr rtlCol="0" anchor="ctr"/>
+          <a:lstStyle/>
+          <a:p>
+            <a:pPr algn="ctr"/>
+            <a:r>
+              <a:rPr lang="en-NL" dirty="0">
+                <a:solidFill>
+                  <a:schemeClr val="tx1"/>
+                </a:solidFill>
+              </a:rPr>
+              <a:t>AC</a:t>
+            </a:r>
+          </a:p>
+        </p:txBody>
+      </p:sp>
+      <p:cxnSp>
+        <p:nvCxnSpPr>
+          <p:cNvPr id="20" name="Straight Connector 19">
+            <a:extLst>
+              <a:ext uri="{FF2B5EF4-FFF2-40B4-BE49-F238E27FC236}">
+                <a16:creationId xmlns:a16="http://schemas.microsoft.com/office/drawing/2014/main" id="{D6F62FDA-EE21-DC35-1AE2-EA33D75AD4A5}"/>
+              </a:ext>
+            </a:extLst>
+          </p:cNvPr>
+          <p:cNvCxnSpPr>
+            <a:cxnSpLocks/>
+            <a:stCxn id="19" idx="3"/>
+          </p:cNvCxnSpPr>
+          <p:nvPr/>
+        </p:nvCxnSpPr>
+        <p:spPr>
+          <a:xfrm flipV="1">
+            <a:off x="4115438" y="3304639"/>
+            <a:ext cx="1459430" cy="16907"/>
+          </a:xfrm>
+          <a:prstGeom prst="line">
+            <a:avLst/>
+          </a:prstGeom>
+        </p:spPr>
+        <p:style>
+          <a:lnRef idx="1">
+            <a:schemeClr val="accent1"/>
+          </a:lnRef>
+          <a:fillRef idx="0">
+            <a:schemeClr val="accent1"/>
+          </a:fillRef>
+          <a:effectRef idx="0">
+            <a:schemeClr val="accent1"/>
+          </a:effectRef>
+          <a:fontRef idx="minor">
+            <a:schemeClr val="tx1"/>
+          </a:fontRef>
+        </p:style>
+      </p:cxnSp>
+      <p:cxnSp>
+        <p:nvCxnSpPr>
+          <p:cNvPr id="21" name="Straight Connector 20">
+            <a:extLst>
+              <a:ext uri="{FF2B5EF4-FFF2-40B4-BE49-F238E27FC236}">
+                <a16:creationId xmlns:a16="http://schemas.microsoft.com/office/drawing/2014/main" id="{DDDFA203-A3DE-856E-A56A-30D849AE1BA7}"/>
+              </a:ext>
+            </a:extLst>
+          </p:cNvPr>
+          <p:cNvCxnSpPr>
+            <a:cxnSpLocks/>
+            <a:stCxn id="19" idx="2"/>
+            <a:endCxn id="8" idx="0"/>
+          </p:cNvCxnSpPr>
+          <p:nvPr/>
+        </p:nvCxnSpPr>
+        <p:spPr>
+          <a:xfrm>
+            <a:off x="3809438" y="3627546"/>
+            <a:ext cx="0" cy="667661"/>
+          </a:xfrm>
+          <a:prstGeom prst="line">
+            <a:avLst/>
+          </a:prstGeom>
+          <a:ln>
+            <a:prstDash val="lgDash"/>
+          </a:ln>
+        </p:spPr>
+        <p:style>
+          <a:lnRef idx="1">
+            <a:schemeClr val="accent1"/>
+          </a:lnRef>
+          <a:fillRef idx="0">
+            <a:schemeClr val="accent1"/>
+          </a:fillRef>
+          <a:effectRef idx="0">
+            <a:schemeClr val="accent1"/>
+          </a:effectRef>
+          <a:fontRef idx="minor">
+            <a:schemeClr val="tx1"/>
+          </a:fontRef>
+        </p:style>
+      </p:cxnSp>
+      <p:cxnSp>
+        <p:nvCxnSpPr>
+          <p:cNvPr id="27" name="Curved Connector 26">
+            <a:extLst>
+              <a:ext uri="{FF2B5EF4-FFF2-40B4-BE49-F238E27FC236}">
+                <a16:creationId xmlns:a16="http://schemas.microsoft.com/office/drawing/2014/main" id="{34F1CC1E-B7EF-BAF6-1A56-D27A3D88EAA5}"/>
+              </a:ext>
+            </a:extLst>
+          </p:cNvPr>
+          <p:cNvCxnSpPr>
+            <a:cxnSpLocks/>
+          </p:cNvCxnSpPr>
+          <p:nvPr/>
+        </p:nvCxnSpPr>
+        <p:spPr>
+          <a:xfrm rot="5400000" flipH="1" flipV="1">
+            <a:off x="1760640" y="3968048"/>
+            <a:ext cx="1312185" cy="2055814"/>
+          </a:xfrm>
+          <a:prstGeom prst="curvedConnector3">
+            <a:avLst>
+              <a:gd name="adj1" fmla="val -17421"/>
+            </a:avLst>
+          </a:prstGeom>
+          <a:ln w="38100">
+            <a:solidFill>
+              <a:schemeClr val="accent6"/>
+            </a:solidFill>
+            <a:tailEnd type="triangle"/>
+          </a:ln>
+        </p:spPr>
+        <p:style>
+          <a:lnRef idx="1">
+            <a:schemeClr val="accent1"/>
+          </a:lnRef>
+          <a:fillRef idx="0">
+            <a:schemeClr val="accent1"/>
+          </a:fillRef>
+          <a:effectRef idx="0">
+            <a:schemeClr val="accent1"/>
+          </a:effectRef>
+          <a:fontRef idx="minor">
+            <a:schemeClr val="tx1"/>
+          </a:fontRef>
+        </p:style>
+      </p:cxnSp>
+      <p:sp>
+        <p:nvSpPr>
+          <p:cNvPr id="31" name="TextBox 30">
+            <a:extLst>
+              <a:ext uri="{FF2B5EF4-FFF2-40B4-BE49-F238E27FC236}">
+                <a16:creationId xmlns:a16="http://schemas.microsoft.com/office/drawing/2014/main" id="{1C0C958D-585E-25A1-2F4E-AC6AD1322080}"/>
+              </a:ext>
+            </a:extLst>
+          </p:cNvPr>
+          <p:cNvSpPr txBox="1"/>
+          <p:nvPr/>
+        </p:nvSpPr>
+        <p:spPr>
+          <a:xfrm>
+            <a:off x="4246830" y="5117351"/>
+            <a:ext cx="1181029" cy="369332"/>
+          </a:xfrm>
+          <a:prstGeom prst="rect">
+            <a:avLst/>
+          </a:prstGeom>
+          <a:noFill/>
+        </p:spPr>
+        <p:txBody>
+          <a:bodyPr wrap="none" rtlCol="0">
+            <a:spAutoFit/>
+          </a:bodyPr>
+          <a:lstStyle/>
+          <a:p>
+            <a:r>
+              <a:rPr lang="en-NL" dirty="0">
+                <a:solidFill>
+                  <a:schemeClr val="accent6"/>
+                </a:solidFill>
+              </a:rPr>
+              <a:t>query step</a:t>
+            </a:r>
+          </a:p>
+        </p:txBody>
+      </p:sp>
+      <p:sp>
+        <p:nvSpPr>
+          <p:cNvPr id="2" name="Oval 1">
+            <a:extLst>
+              <a:ext uri="{FF2B5EF4-FFF2-40B4-BE49-F238E27FC236}">
+                <a16:creationId xmlns:a16="http://schemas.microsoft.com/office/drawing/2014/main" id="{2435C450-E9EC-A2BC-875B-63BDF37C6C65}"/>
+              </a:ext>
+            </a:extLst>
+          </p:cNvPr>
+          <p:cNvSpPr/>
+          <p:nvPr/>
+        </p:nvSpPr>
+        <p:spPr>
+          <a:xfrm>
+            <a:off x="6680523" y="3829786"/>
+            <a:ext cx="580767" cy="580767"/>
+          </a:xfrm>
+          <a:prstGeom prst="ellipse">
+            <a:avLst/>
+          </a:prstGeom>
+          <a:noFill/>
+        </p:spPr>
+        <p:style>
+          <a:lnRef idx="2">
+            <a:schemeClr val="accent1">
+              <a:shade val="50000"/>
+            </a:schemeClr>
+          </a:lnRef>
+          <a:fillRef idx="1">
+            <a:schemeClr val="accent1"/>
+          </a:fillRef>
+          <a:effectRef idx="0">
+            <a:schemeClr val="accent1"/>
+          </a:effectRef>
+          <a:fontRef idx="minor">
+            <a:schemeClr val="lt1"/>
+          </a:fontRef>
+        </p:style>
+        <p:txBody>
+          <a:bodyPr rtlCol="0" anchor="ctr"/>
+          <a:lstStyle/>
+          <a:p>
+            <a:pPr algn="ctr"/>
+            <a:r>
+              <a:rPr lang="en-NL" dirty="0">
+                <a:solidFill>
+                  <a:schemeClr val="tx1"/>
+                </a:solidFill>
+              </a:rPr>
+              <a:t>A</a:t>
+            </a:r>
+          </a:p>
+        </p:txBody>
+      </p:sp>
+      <p:sp>
+        <p:nvSpPr>
+          <p:cNvPr id="4" name="Oval 3">
+            <a:extLst>
+              <a:ext uri="{FF2B5EF4-FFF2-40B4-BE49-F238E27FC236}">
+                <a16:creationId xmlns:a16="http://schemas.microsoft.com/office/drawing/2014/main" id="{57384CC0-98F4-1207-E519-A96347003FC7}"/>
+              </a:ext>
+            </a:extLst>
+          </p:cNvPr>
+          <p:cNvSpPr/>
+          <p:nvPr/>
+        </p:nvSpPr>
+        <p:spPr>
+          <a:xfrm>
+            <a:off x="6680522" y="1247040"/>
+            <a:ext cx="580767" cy="580767"/>
+          </a:xfrm>
+          <a:prstGeom prst="ellipse">
+            <a:avLst/>
+          </a:prstGeom>
+          <a:noFill/>
+        </p:spPr>
+        <p:style>
+          <a:lnRef idx="2">
+            <a:schemeClr val="accent1">
+              <a:shade val="50000"/>
+            </a:schemeClr>
+          </a:lnRef>
+          <a:fillRef idx="1">
+            <a:schemeClr val="accent1"/>
+          </a:fillRef>
+          <a:effectRef idx="0">
+            <a:schemeClr val="accent1"/>
+          </a:effectRef>
+          <a:fontRef idx="minor">
+            <a:schemeClr val="lt1"/>
+          </a:fontRef>
+        </p:style>
+        <p:txBody>
+          <a:bodyPr rtlCol="0" anchor="ctr"/>
+          <a:lstStyle/>
+          <a:p>
+            <a:pPr algn="ctr"/>
+            <a:r>
+              <a:rPr lang="en-NL" dirty="0">
+                <a:solidFill>
+                  <a:schemeClr val="tx1"/>
+                </a:solidFill>
+              </a:rPr>
+              <a:t>R</a:t>
+            </a:r>
+          </a:p>
+        </p:txBody>
+      </p:sp>
+      <p:cxnSp>
+        <p:nvCxnSpPr>
+          <p:cNvPr id="7" name="Straight Connector 6">
+            <a:extLst>
+              <a:ext uri="{FF2B5EF4-FFF2-40B4-BE49-F238E27FC236}">
+                <a16:creationId xmlns:a16="http://schemas.microsoft.com/office/drawing/2014/main" id="{1549C558-184A-92B1-1DF9-84F5B14524A7}"/>
+              </a:ext>
+            </a:extLst>
+          </p:cNvPr>
+          <p:cNvCxnSpPr>
+            <a:cxnSpLocks/>
+            <a:stCxn id="2" idx="0"/>
+            <a:endCxn id="18" idx="4"/>
+          </p:cNvCxnSpPr>
+          <p:nvPr/>
+        </p:nvCxnSpPr>
+        <p:spPr>
+          <a:xfrm flipV="1">
+            <a:off x="6970907" y="3130892"/>
+            <a:ext cx="1" cy="698894"/>
+          </a:xfrm>
+          <a:prstGeom prst="line">
+            <a:avLst/>
+          </a:prstGeom>
+          <a:ln>
+            <a:tailEnd type="triangle" w="lg" len="lg"/>
+          </a:ln>
+        </p:spPr>
+        <p:style>
+          <a:lnRef idx="1">
+            <a:schemeClr val="accent1"/>
+          </a:lnRef>
+          <a:fillRef idx="0">
+            <a:schemeClr val="accent1"/>
+          </a:fillRef>
+          <a:effectRef idx="0">
+            <a:schemeClr val="accent1"/>
+          </a:effectRef>
+          <a:fontRef idx="minor">
+            <a:schemeClr val="tx1"/>
+          </a:fontRef>
+        </p:style>
+      </p:cxnSp>
+      <p:cxnSp>
+        <p:nvCxnSpPr>
+          <p:cNvPr id="11" name="Straight Connector 10">
+            <a:extLst>
+              <a:ext uri="{FF2B5EF4-FFF2-40B4-BE49-F238E27FC236}">
+                <a16:creationId xmlns:a16="http://schemas.microsoft.com/office/drawing/2014/main" id="{B17A3525-D64A-BA44-B4ED-785381266C21}"/>
+              </a:ext>
+            </a:extLst>
+          </p:cNvPr>
+          <p:cNvCxnSpPr>
+            <a:cxnSpLocks/>
+          </p:cNvCxnSpPr>
+          <p:nvPr/>
+        </p:nvCxnSpPr>
+        <p:spPr>
+          <a:xfrm flipV="1">
+            <a:off x="13236963" y="3219702"/>
+            <a:ext cx="1" cy="698894"/>
+          </a:xfrm>
+          <a:prstGeom prst="line">
+            <a:avLst/>
+          </a:prstGeom>
+        </p:spPr>
+        <p:style>
+          <a:lnRef idx="1">
+            <a:schemeClr val="accent1"/>
+          </a:lnRef>
+          <a:fillRef idx="0">
+            <a:schemeClr val="accent1"/>
+          </a:fillRef>
+          <a:effectRef idx="0">
+            <a:schemeClr val="accent1"/>
+          </a:effectRef>
+          <a:fontRef idx="minor">
+            <a:schemeClr val="tx1"/>
+          </a:fontRef>
+        </p:style>
+      </p:cxnSp>
+      <p:cxnSp>
+        <p:nvCxnSpPr>
+          <p:cNvPr id="14" name="Straight Connector 13">
+            <a:extLst>
+              <a:ext uri="{FF2B5EF4-FFF2-40B4-BE49-F238E27FC236}">
+                <a16:creationId xmlns:a16="http://schemas.microsoft.com/office/drawing/2014/main" id="{74EC9F1D-BB9E-A699-754C-BF006ABB702E}"/>
+              </a:ext>
+            </a:extLst>
+          </p:cNvPr>
+          <p:cNvCxnSpPr>
+            <a:cxnSpLocks/>
+          </p:cNvCxnSpPr>
+          <p:nvPr/>
+        </p:nvCxnSpPr>
+        <p:spPr>
+          <a:xfrm flipV="1">
+            <a:off x="6995232" y="1839519"/>
+            <a:ext cx="1" cy="698894"/>
+          </a:xfrm>
+          <a:prstGeom prst="line">
+            <a:avLst/>
+          </a:prstGeom>
+          <a:ln>
+            <a:tailEnd type="triangle" w="lg" len="lg"/>
+          </a:ln>
+        </p:spPr>
+        <p:style>
+          <a:lnRef idx="1">
+            <a:schemeClr val="accent1"/>
+          </a:lnRef>
+          <a:fillRef idx="0">
+            <a:schemeClr val="accent1"/>
+          </a:fillRef>
+          <a:effectRef idx="0">
+            <a:schemeClr val="accent1"/>
+          </a:effectRef>
+          <a:fontRef idx="minor">
+            <a:schemeClr val="tx1"/>
+          </a:fontRef>
+        </p:style>
+      </p:cxnSp>
+    </p:spTree>
+    <p:extLst>
+      <p:ext uri="{BB962C8B-B14F-4D97-AF65-F5344CB8AC3E}">
+        <p14:creationId xmlns:p14="http://schemas.microsoft.com/office/powerpoint/2010/main" val="1870191456"/>
+      </p:ext>
+    </p:extLst>
+  </p:cSld>
+  <p:clrMapOvr>
+    <a:masterClrMapping/>
+  </p:clrMapOvr>
+</p:sld>
+</file>
+
 <file path=ppt/theme/theme1.xml><?xml version="1.0" encoding="utf-8"?>
 <a:theme xmlns:a="http://schemas.openxmlformats.org/drawingml/2006/main" name="Office Theme">
   <a:themeElements>
@@ -8167,4 +9566,299 @@
     </a:ext>
   </a:extLst>
 </a:theme>
+</file>
+
+<file path=ppt/theme/theme2.xml><?xml version="1.0" encoding="utf-8"?>
+<a:theme xmlns:a="http://schemas.openxmlformats.org/drawingml/2006/main" name="Office Theme">
+  <a:themeElements>
+    <a:clrScheme name="Office">
+      <a:dk1>
+        <a:sysClr val="windowText" lastClr="000000"/>
+      </a:dk1>
+      <a:lt1>
+        <a:sysClr val="window" lastClr="FFFFFF"/>
+      </a:lt1>
+      <a:dk2>
+        <a:srgbClr val="44546A"/>
+      </a:dk2>
+      <a:lt2>
+        <a:srgbClr val="E7E6E6"/>
+      </a:lt2>
+      <a:accent1>
+        <a:srgbClr val="4472C4"/>
+      </a:accent1>
+      <a:accent2>
+        <a:srgbClr val="ED7D31"/>
+      </a:accent2>
+      <a:accent3>
+        <a:srgbClr val="A5A5A5"/>
+      </a:accent3>
+      <a:accent4>
+        <a:srgbClr val="FFC000"/>
+      </a:accent4>
+      <a:accent5>
+        <a:srgbClr val="5B9BD5"/>
+      </a:accent5>
+      <a:accent6>
+        <a:srgbClr val="70AD47"/>
+      </a:accent6>
+      <a:hlink>
+        <a:srgbClr val="0563C1"/>
+      </a:hlink>
+      <a:folHlink>
+        <a:srgbClr val="954F72"/>
+      </a:folHlink>
+    </a:clrScheme>
+    <a:fontScheme name="Office">
+      <a:majorFont>
+        <a:latin typeface="Calibri Light" panose="020F0302020204030204"/>
+        <a:ea typeface=""/>
+        <a:cs typeface=""/>
+        <a:font script="Jpan" typeface="游ゴシック Light"/>
+        <a:font script="Hang" typeface="맑은 고딕"/>
+        <a:font script="Hans" typeface="等线 Light"/>
+        <a:font script="Hant" typeface="新細明體"/>
+        <a:font script="Arab" typeface="Times New Roman"/>
+        <a:font script="Hebr" typeface="Times New Roman"/>
+        <a:font script="Thai" typeface="Angsana New"/>
+        <a:font script="Ethi" typeface="Nyala"/>
+        <a:font script="Beng" typeface="Vrinda"/>
+        <a:font script="Gujr" typeface="Shruti"/>
+        <a:font script="Khmr" typeface="MoolBoran"/>
+        <a:font script="Knda" typeface="Tunga"/>
+        <a:font script="Guru" typeface="Raavi"/>
+        <a:font script="Cans" typeface="Euphemia"/>
+        <a:font script="Cher" typeface="Plantagenet Cherokee"/>
+        <a:font script="Yiii" typeface="Microsoft Yi Baiti"/>
+        <a:font script="Tibt" typeface="Microsoft Himalaya"/>
+        <a:font script="Thaa" typeface="MV Boli"/>
+        <a:font script="Deva" typeface="Mangal"/>
+        <a:font script="Telu" typeface="Gautami"/>
+        <a:font script="Taml" typeface="Latha"/>
+        <a:font script="Syrc" typeface="Estrangelo Edessa"/>
+        <a:font script="Orya" typeface="Kalinga"/>
+        <a:font script="Mlym" typeface="Kartika"/>
+        <a:font script="Laoo" typeface="DokChampa"/>
+        <a:font script="Sinh" typeface="Iskoola Pota"/>
+        <a:font script="Mong" typeface="Mongolian Baiti"/>
+        <a:font script="Viet" typeface="Times New Roman"/>
+        <a:font script="Uigh" typeface="Microsoft Uighur"/>
+        <a:font script="Geor" typeface="Sylfaen"/>
+        <a:font script="Armn" typeface="Arial"/>
+        <a:font script="Bugi" typeface="Leelawadee UI"/>
+        <a:font script="Bopo" typeface="Microsoft JhengHei"/>
+        <a:font script="Java" typeface="Javanese Text"/>
+        <a:font script="Lisu" typeface="Segoe UI"/>
+        <a:font script="Mymr" typeface="Myanmar Text"/>
+        <a:font script="Nkoo" typeface="Ebrima"/>
+        <a:font script="Olck" typeface="Nirmala UI"/>
+        <a:font script="Osma" typeface="Ebrima"/>
+        <a:font script="Phag" typeface="Phagspa"/>
+        <a:font script="Syrn" typeface="Estrangelo Edessa"/>
+        <a:font script="Syrj" typeface="Estrangelo Edessa"/>
+        <a:font script="Syre" typeface="Estrangelo Edessa"/>
+        <a:font script="Sora" typeface="Nirmala UI"/>
+        <a:font script="Tale" typeface="Microsoft Tai Le"/>
+        <a:font script="Talu" typeface="Microsoft New Tai Lue"/>
+        <a:font script="Tfng" typeface="Ebrima"/>
+      </a:majorFont>
+      <a:minorFont>
+        <a:latin typeface="Calibri" panose="020F0502020204030204"/>
+        <a:ea typeface=""/>
+        <a:cs typeface=""/>
+        <a:font script="Jpan" typeface="游ゴシック"/>
+        <a:font script="Hang" typeface="맑은 고딕"/>
+        <a:font script="Hans" typeface="等线"/>
+        <a:font script="Hant" typeface="新細明體"/>
+        <a:font script="Arab" typeface="Arial"/>
+        <a:font script="Hebr" typeface="Arial"/>
+        <a:font script="Thai" typeface="Cordia New"/>
+        <a:font script="Ethi" typeface="Nyala"/>
+        <a:font script="Beng" typeface="Vrinda"/>
+        <a:font script="Gujr" typeface="Shruti"/>
+        <a:font script="Khmr" typeface="DaunPenh"/>
+        <a:font script="Knda" typeface="Tunga"/>
+        <a:font script="Guru" typeface="Raavi"/>
+        <a:font script="Cans" typeface="Euphemia"/>
+        <a:font script="Cher" typeface="Plantagenet Cherokee"/>
+        <a:font script="Yiii" typeface="Microsoft Yi Baiti"/>
+        <a:font script="Tibt" typeface="Microsoft Himalaya"/>
+        <a:font script="Thaa" typeface="MV Boli"/>
+        <a:font script="Deva" typeface="Mangal"/>
+        <a:font script="Telu" typeface="Gautami"/>
+        <a:font script="Taml" typeface="Latha"/>
+        <a:font script="Syrc" typeface="Estrangelo Edessa"/>
+        <a:font script="Orya" typeface="Kalinga"/>
+        <a:font script="Mlym" typeface="Kartika"/>
+        <a:font script="Laoo" typeface="DokChampa"/>
+        <a:font script="Sinh" typeface="Iskoola Pota"/>
+        <a:font script="Mong" typeface="Mongolian Baiti"/>
+        <a:font script="Viet" typeface="Arial"/>
+        <a:font script="Uigh" typeface="Microsoft Uighur"/>
+        <a:font script="Geor" typeface="Sylfaen"/>
+        <a:font script="Armn" typeface="Arial"/>
+        <a:font script="Bugi" typeface="Leelawadee UI"/>
+        <a:font script="Bopo" typeface="Microsoft JhengHei"/>
+        <a:font script="Java" typeface="Javanese Text"/>
+        <a:font script="Lisu" typeface="Segoe UI"/>
+        <a:font script="Mymr" typeface="Myanmar Text"/>
+        <a:font script="Nkoo" typeface="Ebrima"/>
+        <a:font script="Olck" typeface="Nirmala UI"/>
+        <a:font script="Osma" typeface="Ebrima"/>
+        <a:font script="Phag" typeface="Phagspa"/>
+        <a:font script="Syrn" typeface="Estrangelo Edessa"/>
+        <a:font script="Syrj" typeface="Estrangelo Edessa"/>
+        <a:font script="Syre" typeface="Estrangelo Edessa"/>
+        <a:font script="Sora" typeface="Nirmala UI"/>
+        <a:font script="Tale" typeface="Microsoft Tai Le"/>
+        <a:font script="Talu" typeface="Microsoft New Tai Lue"/>
+        <a:font script="Tfng" typeface="Ebrima"/>
+      </a:minorFont>
+    </a:fontScheme>
+    <a:fmtScheme name="Office">
+      <a:fillStyleLst>
+        <a:solidFill>
+          <a:schemeClr val="phClr"/>
+        </a:solidFill>
+        <a:gradFill rotWithShape="1">
+          <a:gsLst>
+            <a:gs pos="0">
+              <a:schemeClr val="phClr">
+                <a:lumMod val="110000"/>
+                <a:satMod val="105000"/>
+                <a:tint val="67000"/>
+              </a:schemeClr>
+            </a:gs>
+            <a:gs pos="50000">
+              <a:schemeClr val="phClr">
+                <a:lumMod val="105000"/>
+                <a:satMod val="103000"/>
+                <a:tint val="73000"/>
+              </a:schemeClr>
+            </a:gs>
+            <a:gs pos="100000">
+              <a:schemeClr val="phClr">
+                <a:lumMod val="105000"/>
+                <a:satMod val="109000"/>
+                <a:tint val="81000"/>
+              </a:schemeClr>
+            </a:gs>
+          </a:gsLst>
+          <a:lin ang="5400000" scaled="0"/>
+        </a:gradFill>
+        <a:gradFill rotWithShape="1">
+          <a:gsLst>
+            <a:gs pos="0">
+              <a:schemeClr val="phClr">
+                <a:satMod val="103000"/>
+                <a:lumMod val="102000"/>
+                <a:tint val="94000"/>
+              </a:schemeClr>
+            </a:gs>
+            <a:gs pos="50000">
+              <a:schemeClr val="phClr">
+                <a:satMod val="110000"/>
+                <a:lumMod val="100000"/>
+                <a:shade val="100000"/>
+              </a:schemeClr>
+            </a:gs>
+            <a:gs pos="100000">
+              <a:schemeClr val="phClr">
+                <a:lumMod val="99000"/>
+                <a:satMod val="120000"/>
+                <a:shade val="78000"/>
+              </a:schemeClr>
+            </a:gs>
+          </a:gsLst>
+          <a:lin ang="5400000" scaled="0"/>
+        </a:gradFill>
+      </a:fillStyleLst>
+      <a:lnStyleLst>
+        <a:ln w="6350" cap="flat" cmpd="sng" algn="ctr">
+          <a:solidFill>
+            <a:schemeClr val="phClr"/>
+          </a:solidFill>
+          <a:prstDash val="solid"/>
+          <a:miter lim="800000"/>
+        </a:ln>
+        <a:ln w="12700" cap="flat" cmpd="sng" algn="ctr">
+          <a:solidFill>
+            <a:schemeClr val="phClr"/>
+          </a:solidFill>
+          <a:prstDash val="solid"/>
+          <a:miter lim="800000"/>
+        </a:ln>
+        <a:ln w="19050" cap="flat" cmpd="sng" algn="ctr">
+          <a:solidFill>
+            <a:schemeClr val="phClr"/>
+          </a:solidFill>
+          <a:prstDash val="solid"/>
+          <a:miter lim="800000"/>
+        </a:ln>
+      </a:lnStyleLst>
+      <a:effectStyleLst>
+        <a:effectStyle>
+          <a:effectLst/>
+        </a:effectStyle>
+        <a:effectStyle>
+          <a:effectLst/>
+        </a:effectStyle>
+        <a:effectStyle>
+          <a:effectLst>
+            <a:outerShdw blurRad="57150" dist="19050" dir="5400000" algn="ctr" rotWithShape="0">
+              <a:srgbClr val="000000">
+                <a:alpha val="63000"/>
+              </a:srgbClr>
+            </a:outerShdw>
+          </a:effectLst>
+        </a:effectStyle>
+      </a:effectStyleLst>
+      <a:bgFillStyleLst>
+        <a:solidFill>
+          <a:schemeClr val="phClr"/>
+        </a:solidFill>
+        <a:solidFill>
+          <a:schemeClr val="phClr">
+            <a:tint val="95000"/>
+            <a:satMod val="170000"/>
+          </a:schemeClr>
+        </a:solidFill>
+        <a:gradFill rotWithShape="1">
+          <a:gsLst>
+            <a:gs pos="0">
+              <a:schemeClr val="phClr">
+                <a:tint val="93000"/>
+                <a:satMod val="150000"/>
+                <a:shade val="98000"/>
+                <a:lumMod val="102000"/>
+              </a:schemeClr>
+            </a:gs>
+            <a:gs pos="50000">
+              <a:schemeClr val="phClr">
+                <a:tint val="98000"/>
+                <a:satMod val="130000"/>
+                <a:shade val="90000"/>
+                <a:lumMod val="103000"/>
+              </a:schemeClr>
+            </a:gs>
+            <a:gs pos="100000">
+              <a:schemeClr val="phClr">
+                <a:shade val="63000"/>
+                <a:satMod val="120000"/>
+              </a:schemeClr>
+            </a:gs>
+          </a:gsLst>
+          <a:lin ang="5400000" scaled="0"/>
+        </a:gradFill>
+      </a:bgFillStyleLst>
+    </a:fmtScheme>
+  </a:themeElements>
+  <a:objectDefaults/>
+  <a:extraClrSchemeLst/>
+  <a:extLst>
+    <a:ext uri="{05A4C25C-085E-4340-85A3-A5531E510DB2}">
+      <thm15:themeFamily xmlns:thm15="http://schemas.microsoft.com/office/thememl/2012/main" name="Office Theme" id="{62F939B6-93AF-4DB8-9C6B-D6C7DFDC589F}" vid="{4A3C46E8-61CC-4603-A589-7422A47A8E4A}"/>
+    </a:ext>
+  </a:extLst>
+</a:theme>
 </file>
</xml_diff>